<commit_message>
More output labels for Random Forest Classifier
</commit_message>
<xml_diff>
--- a/25_RandomForestClassifier.pptx
+++ b/25_RandomForestClassifier.pptx
@@ -5,10 +5,10 @@
     <p:sldMasterId id="2147483648" r:id="rId1"/>
   </p:sldMasterIdLst>
   <p:notesMasterIdLst>
-    <p:notesMasterId r:id="rId24"/>
+    <p:notesMasterId r:id="rId26"/>
   </p:notesMasterIdLst>
   <p:handoutMasterIdLst>
-    <p:handoutMasterId r:id="rId25"/>
+    <p:handoutMasterId r:id="rId27"/>
   </p:handoutMasterIdLst>
   <p:sldIdLst>
     <p:sldId id="256" r:id="rId2"/>
@@ -27,12 +27,14 @@
     <p:sldId id="297" r:id="rId15"/>
     <p:sldId id="298" r:id="rId16"/>
     <p:sldId id="299" r:id="rId17"/>
-    <p:sldId id="284" r:id="rId18"/>
-    <p:sldId id="267" r:id="rId19"/>
-    <p:sldId id="300" r:id="rId20"/>
-    <p:sldId id="301" r:id="rId21"/>
-    <p:sldId id="302" r:id="rId22"/>
-    <p:sldId id="259" r:id="rId23"/>
+    <p:sldId id="303" r:id="rId18"/>
+    <p:sldId id="304" r:id="rId19"/>
+    <p:sldId id="284" r:id="rId20"/>
+    <p:sldId id="267" r:id="rId21"/>
+    <p:sldId id="300" r:id="rId22"/>
+    <p:sldId id="301" r:id="rId23"/>
+    <p:sldId id="302" r:id="rId24"/>
+    <p:sldId id="259" r:id="rId25"/>
   </p:sldIdLst>
   <p:sldSz cx="9144000" cy="6858000" type="screen4x3"/>
   <p:notesSz cx="6858000" cy="9144000"/>
@@ -8508,14 +8510,14 @@
           <a:lstStyle/>
           <a:p>
             <a:r>
-              <a:rPr lang="en-US" altLang="zh-TW" sz="4800" b="1" dirty="0">
+              <a:rPr lang="en-US" altLang="zh-TW" b="1" dirty="0">
                 <a:solidFill>
                   <a:srgbClr val="FFFF00"/>
                 </a:solidFill>
               </a:rPr>
-              <a:t>25.6 Quiz</a:t>
-            </a:r>
-            <a:endParaRPr lang="zh-TW" altLang="en-US" sz="4800" b="1" dirty="0">
+              <a:t>25.6 Create More Labels</a:t>
+            </a:r>
+            <a:endParaRPr lang="zh-TW" altLang="en-US" b="1" dirty="0">
               <a:solidFill>
                 <a:srgbClr val="FFFF00"/>
               </a:solidFill>
@@ -8604,7 +8606,7 @@
     </p:spTree>
     <p:extLst>
       <p:ext uri="{BB962C8B-B14F-4D97-AF65-F5344CB8AC3E}">
-        <p14:creationId xmlns:p14="http://schemas.microsoft.com/office/powerpoint/2010/main" val="3271172281"/>
+        <p14:creationId xmlns:p14="http://schemas.microsoft.com/office/powerpoint/2010/main" val="3906382666"/>
       </p:ext>
     </p:extLst>
   </p:cSld>
@@ -8675,7 +8677,7 @@
         </p:spPr>
         <p:txBody>
           <a:bodyPr>
-            <a:normAutofit/>
+            <a:noAutofit/>
           </a:bodyPr>
           <a:lstStyle/>
           <a:p>
@@ -8686,7 +8688,7 @@
                   <a:srgbClr val="FFFF00"/>
                 </a:solidFill>
               </a:rPr>
-              <a:t>25.6 Quiz</a:t>
+              <a:t>25.6 Create More Labels</a:t>
             </a:r>
             <a:endParaRPr lang="zh-TW" altLang="en-US" b="1" dirty="0">
               <a:solidFill>
@@ -8708,8 +8710,8 @@
         </p:nvSpPr>
         <p:spPr>
           <a:xfrm>
-            <a:off x="425697" y="1259368"/>
-            <a:ext cx="8106743" cy="4401880"/>
+            <a:off x="333872" y="1356857"/>
+            <a:ext cx="8352928" cy="415959"/>
           </a:xfrm>
           <a:ln>
             <a:solidFill>
@@ -8737,391 +8739,7 @@
                   <a:schemeClr val="tx1"/>
                 </a:solidFill>
               </a:rPr>
-              <a:t>Quiz</a:t>
-            </a:r>
-          </a:p>
-          <a:p>
-            <a:pPr marL="342900" indent="-342900" algn="l">
-              <a:buClr>
-                <a:srgbClr val="0070C0"/>
-              </a:buClr>
-              <a:buSzPct val="80000"/>
-              <a:buFont typeface="Wingdings" pitchFamily="2" charset="2"/>
-              <a:buChar char="u"/>
-            </a:pPr>
-            <a:r>
-              <a:rPr lang="en-US" sz="1800" dirty="0">
-                <a:solidFill>
-                  <a:schemeClr val="tx1"/>
-                </a:solidFill>
-              </a:rPr>
-              <a:t>1. What statements for read text and put label?</a:t>
-            </a:r>
-          </a:p>
-          <a:p>
-            <a:pPr marL="342900" indent="-342900" algn="l">
-              <a:buClr>
-                <a:srgbClr val="0070C0"/>
-              </a:buClr>
-              <a:buSzPct val="80000"/>
-              <a:buFont typeface="Wingdings" pitchFamily="2" charset="2"/>
-              <a:buChar char="u"/>
-            </a:pPr>
-            <a:r>
-              <a:rPr lang="en-US" sz="1800" dirty="0">
-                <a:solidFill>
-                  <a:schemeClr val="tx1"/>
-                </a:solidFill>
-              </a:rPr>
-              <a:t>Ans:</a:t>
-            </a:r>
-          </a:p>
-          <a:p>
-            <a:pPr marL="342900" indent="-342900" algn="l">
-              <a:buClr>
-                <a:srgbClr val="0070C0"/>
-              </a:buClr>
-              <a:buSzPct val="80000"/>
-              <a:buFont typeface="Wingdings" pitchFamily="2" charset="2"/>
-              <a:buChar char="u"/>
-            </a:pPr>
-            <a:r>
-              <a:rPr lang="en-US" sz="1800" dirty="0">
-                <a:solidFill>
-                  <a:schemeClr val="tx1"/>
-                </a:solidFill>
-              </a:rPr>
-              <a:t>data = </a:t>
-            </a:r>
-            <a:r>
-              <a:rPr lang="en-US" sz="1800" dirty="0" err="1">
-                <a:solidFill>
-                  <a:schemeClr val="tx1"/>
-                </a:solidFill>
-              </a:rPr>
-              <a:t>pd.read_csv</a:t>
-            </a:r>
-            <a:r>
-              <a:rPr lang="en-US" sz="1800" dirty="0">
-                <a:solidFill>
-                  <a:schemeClr val="tx1"/>
-                </a:solidFill>
-              </a:rPr>
-              <a:t>('../data/</a:t>
-            </a:r>
-            <a:r>
-              <a:rPr lang="en-US" sz="1800" dirty="0" err="1">
-                <a:solidFill>
-                  <a:schemeClr val="tx1"/>
-                </a:solidFill>
-              </a:rPr>
-              <a:t>smsspamcollection</a:t>
-            </a:r>
-            <a:r>
-              <a:rPr lang="en-US" sz="1800" dirty="0">
-                <a:solidFill>
-                  <a:schemeClr val="tx1"/>
-                </a:solidFill>
-              </a:rPr>
-              <a:t>/</a:t>
-            </a:r>
-            <a:r>
-              <a:rPr lang="en-US" sz="1800" dirty="0" err="1">
-                <a:solidFill>
-                  <a:schemeClr val="tx1"/>
-                </a:solidFill>
-              </a:rPr>
-              <a:t>SMSSpamCollection</a:t>
-            </a:r>
-            <a:r>
-              <a:rPr lang="en-US" sz="1800" dirty="0">
-                <a:solidFill>
-                  <a:schemeClr val="tx1"/>
-                </a:solidFill>
-              </a:rPr>
-              <a:t>’, \</a:t>
-            </a:r>
-          </a:p>
-          <a:p>
-            <a:pPr marL="342900" indent="-342900" algn="l">
-              <a:buClr>
-                <a:srgbClr val="0070C0"/>
-              </a:buClr>
-              <a:buSzPct val="80000"/>
-              <a:buFont typeface="Wingdings" pitchFamily="2" charset="2"/>
-              <a:buChar char="u"/>
-            </a:pPr>
-            <a:r>
-              <a:rPr lang="en-US" sz="1800" dirty="0">
-                <a:solidFill>
-                  <a:schemeClr val="tx1"/>
-                </a:solidFill>
-              </a:rPr>
-              <a:t>    </a:t>
-            </a:r>
-            <a:r>
-              <a:rPr lang="en-US" sz="1800" dirty="0" err="1">
-                <a:solidFill>
-                  <a:schemeClr val="tx1"/>
-                </a:solidFill>
-              </a:rPr>
-              <a:t>sep</a:t>
-            </a:r>
-            <a:r>
-              <a:rPr lang="en-US" sz="1800" dirty="0">
-                <a:solidFill>
-                  <a:schemeClr val="tx1"/>
-                </a:solidFill>
-              </a:rPr>
-              <a:t>='\t', header=None)</a:t>
-            </a:r>
-          </a:p>
-          <a:p>
-            <a:pPr marL="342900" indent="-342900" algn="l">
-              <a:buClr>
-                <a:srgbClr val="0070C0"/>
-              </a:buClr>
-              <a:buSzPct val="80000"/>
-              <a:buFont typeface="Wingdings" pitchFamily="2" charset="2"/>
-              <a:buChar char="u"/>
-            </a:pPr>
-            <a:r>
-              <a:rPr lang="en-US" sz="1800" dirty="0" err="1">
-                <a:solidFill>
-                  <a:schemeClr val="tx1"/>
-                </a:solidFill>
-              </a:rPr>
-              <a:t>data.columns</a:t>
-            </a:r>
-            <a:r>
-              <a:rPr lang="en-US" sz="1800" dirty="0">
-                <a:solidFill>
-                  <a:schemeClr val="tx1"/>
-                </a:solidFill>
-              </a:rPr>
-              <a:t> = ['label', 'msg’]</a:t>
-            </a:r>
-          </a:p>
-          <a:p>
-            <a:pPr marL="342900" indent="-342900" algn="l">
-              <a:buClr>
-                <a:srgbClr val="0070C0"/>
-              </a:buClr>
-              <a:buSzPct val="80000"/>
-              <a:buFont typeface="Wingdings" pitchFamily="2" charset="2"/>
-              <a:buChar char="u"/>
-            </a:pPr>
-            <a:r>
-              <a:rPr lang="en-US" sz="1800" dirty="0">
-                <a:solidFill>
-                  <a:schemeClr val="tx1"/>
-                </a:solidFill>
-              </a:rPr>
-              <a:t>2. What statements for add features of message length and punctuation %?</a:t>
-            </a:r>
-          </a:p>
-          <a:p>
-            <a:pPr marL="342900" indent="-342900" algn="l">
-              <a:buClr>
-                <a:srgbClr val="0070C0"/>
-              </a:buClr>
-              <a:buSzPct val="80000"/>
-              <a:buFont typeface="Wingdings" pitchFamily="2" charset="2"/>
-              <a:buChar char="u"/>
-            </a:pPr>
-            <a:r>
-              <a:rPr lang="en-US" sz="1800" dirty="0">
-                <a:solidFill>
-                  <a:schemeClr val="tx1"/>
-                </a:solidFill>
-              </a:rPr>
-              <a:t>Ans:</a:t>
-            </a:r>
-          </a:p>
-          <a:p>
-            <a:pPr marL="342900" indent="-342900" algn="l">
-              <a:buClr>
-                <a:srgbClr val="0070C0"/>
-              </a:buClr>
-              <a:buSzPct val="80000"/>
-              <a:buFont typeface="Wingdings" pitchFamily="2" charset="2"/>
-              <a:buChar char="u"/>
-            </a:pPr>
-            <a:r>
-              <a:rPr lang="en-US" sz="1800" dirty="0">
-                <a:solidFill>
-                  <a:schemeClr val="tx1"/>
-                </a:solidFill>
-              </a:rPr>
-              <a:t>def </a:t>
-            </a:r>
-            <a:r>
-              <a:rPr lang="en-US" sz="1800" dirty="0" err="1">
-                <a:solidFill>
-                  <a:schemeClr val="tx1"/>
-                </a:solidFill>
-              </a:rPr>
-              <a:t>punctuation_count</a:t>
-            </a:r>
-            <a:r>
-              <a:rPr lang="en-US" sz="1800" dirty="0">
-                <a:solidFill>
-                  <a:schemeClr val="tx1"/>
-                </a:solidFill>
-              </a:rPr>
-              <a:t>(txt):</a:t>
-            </a:r>
-          </a:p>
-          <a:p>
-            <a:pPr marL="342900" indent="-342900" algn="l">
-              <a:buClr>
-                <a:srgbClr val="0070C0"/>
-              </a:buClr>
-              <a:buSzPct val="80000"/>
-              <a:buFont typeface="Wingdings" pitchFamily="2" charset="2"/>
-              <a:buChar char="u"/>
-            </a:pPr>
-            <a:r>
-              <a:rPr lang="en-US" sz="1800" dirty="0">
-                <a:solidFill>
-                  <a:schemeClr val="tx1"/>
-                </a:solidFill>
-              </a:rPr>
-              <a:t>    count = sum ([1 for c in txt if c in </a:t>
-            </a:r>
-            <a:r>
-              <a:rPr lang="en-US" sz="1800" dirty="0" err="1">
-                <a:solidFill>
-                  <a:schemeClr val="tx1"/>
-                </a:solidFill>
-              </a:rPr>
-              <a:t>string.punctuation</a:t>
-            </a:r>
-            <a:r>
-              <a:rPr lang="en-US" sz="1800" dirty="0">
-                <a:solidFill>
-                  <a:schemeClr val="tx1"/>
-                </a:solidFill>
-              </a:rPr>
-              <a:t>])</a:t>
-            </a:r>
-          </a:p>
-          <a:p>
-            <a:pPr marL="342900" indent="-342900" algn="l">
-              <a:buClr>
-                <a:srgbClr val="0070C0"/>
-              </a:buClr>
-              <a:buSzPct val="80000"/>
-              <a:buFont typeface="Wingdings" pitchFamily="2" charset="2"/>
-              <a:buChar char="u"/>
-            </a:pPr>
-            <a:r>
-              <a:rPr lang="en-US" sz="1800" dirty="0">
-                <a:solidFill>
-                  <a:schemeClr val="tx1"/>
-                </a:solidFill>
-              </a:rPr>
-              <a:t>    return 100*count/</a:t>
-            </a:r>
-            <a:r>
-              <a:rPr lang="en-US" sz="1800" dirty="0" err="1">
-                <a:solidFill>
-                  <a:schemeClr val="tx1"/>
-                </a:solidFill>
-              </a:rPr>
-              <a:t>len</a:t>
-            </a:r>
-            <a:r>
-              <a:rPr lang="en-US" sz="1800" dirty="0">
-                <a:solidFill>
-                  <a:schemeClr val="tx1"/>
-                </a:solidFill>
-              </a:rPr>
-              <a:t>(txt)</a:t>
-            </a:r>
-          </a:p>
-          <a:p>
-            <a:pPr marL="342900" indent="-342900" algn="l">
-              <a:buClr>
-                <a:srgbClr val="0070C0"/>
-              </a:buClr>
-              <a:buSzPct val="80000"/>
-              <a:buFont typeface="Wingdings" pitchFamily="2" charset="2"/>
-              <a:buChar char="u"/>
-            </a:pPr>
-            <a:r>
-              <a:rPr lang="en-US" sz="1800" dirty="0">
-                <a:solidFill>
-                  <a:schemeClr val="tx1"/>
-                </a:solidFill>
-              </a:rPr>
-              <a:t>data['</a:t>
-            </a:r>
-            <a:r>
-              <a:rPr lang="en-US" sz="1800" dirty="0" err="1">
-                <a:solidFill>
-                  <a:schemeClr val="tx1"/>
-                </a:solidFill>
-              </a:rPr>
-              <a:t>msg_len</a:t>
-            </a:r>
-            <a:r>
-              <a:rPr lang="en-US" sz="1800" dirty="0">
-                <a:solidFill>
-                  <a:schemeClr val="tx1"/>
-                </a:solidFill>
-              </a:rPr>
-              <a:t>'] = data['msg'].apply(lambda x: </a:t>
-            </a:r>
-            <a:r>
-              <a:rPr lang="en-US" sz="1800" dirty="0" err="1">
-                <a:solidFill>
-                  <a:schemeClr val="tx1"/>
-                </a:solidFill>
-              </a:rPr>
-              <a:t>len</a:t>
-            </a:r>
-            <a:r>
-              <a:rPr lang="en-US" sz="1800" dirty="0">
-                <a:solidFill>
-                  <a:schemeClr val="tx1"/>
-                </a:solidFill>
-              </a:rPr>
-              <a:t>(x))</a:t>
-            </a:r>
-          </a:p>
-          <a:p>
-            <a:pPr marL="342900" indent="-342900" algn="l">
-              <a:buClr>
-                <a:srgbClr val="0070C0"/>
-              </a:buClr>
-              <a:buSzPct val="80000"/>
-              <a:buFont typeface="Wingdings" pitchFamily="2" charset="2"/>
-              <a:buChar char="u"/>
-            </a:pPr>
-            <a:r>
-              <a:rPr lang="en-US" sz="1800" dirty="0">
-                <a:solidFill>
-                  <a:schemeClr val="tx1"/>
-                </a:solidFill>
-              </a:rPr>
-              <a:t>data['punctuation_%'] = data['msg'].apply (lambda x: </a:t>
-            </a:r>
-            <a:r>
-              <a:rPr lang="en-US" sz="1800" dirty="0" err="1">
-                <a:solidFill>
-                  <a:schemeClr val="tx1"/>
-                </a:solidFill>
-              </a:rPr>
-              <a:t>punctuation_count</a:t>
-            </a:r>
-            <a:r>
-              <a:rPr lang="en-US" sz="1800" dirty="0">
-                <a:solidFill>
-                  <a:schemeClr val="tx1"/>
-                </a:solidFill>
-              </a:rPr>
-              <a:t>(x))</a:t>
+              <a:t>Create More Labels for Classification</a:t>
             </a:r>
           </a:p>
         </p:txBody>
@@ -9238,10 +8856,80 @@
           </a:p>
         </p:txBody>
       </p:sp>
+      <p:pic>
+        <p:nvPicPr>
+          <p:cNvPr id="9" name="Picture 8">
+            <a:extLst>
+              <a:ext uri="{FF2B5EF4-FFF2-40B4-BE49-F238E27FC236}">
+                <a16:creationId xmlns:a16="http://schemas.microsoft.com/office/drawing/2014/main" id="{03C58CA9-2542-4C06-8BD4-489F8C66CB36}"/>
+              </a:ext>
+            </a:extLst>
+          </p:cNvPr>
+          <p:cNvPicPr>
+            <a:picLocks noChangeAspect="1"/>
+          </p:cNvPicPr>
+          <p:nvPr/>
+        </p:nvPicPr>
+        <p:blipFill>
+          <a:blip r:embed="rId3"/>
+          <a:stretch>
+            <a:fillRect/>
+          </a:stretch>
+        </p:blipFill>
+        <p:spPr>
+          <a:xfrm>
+            <a:off x="483504" y="1844824"/>
+            <a:ext cx="4725392" cy="3958241"/>
+          </a:xfrm>
+          <a:prstGeom prst="rect">
+            <a:avLst/>
+          </a:prstGeom>
+          <a:ln>
+            <a:solidFill>
+              <a:srgbClr val="C00000"/>
+            </a:solidFill>
+          </a:ln>
+        </p:spPr>
+      </p:pic>
+      <p:pic>
+        <p:nvPicPr>
+          <p:cNvPr id="11" name="Picture 10">
+            <a:extLst>
+              <a:ext uri="{FF2B5EF4-FFF2-40B4-BE49-F238E27FC236}">
+                <a16:creationId xmlns:a16="http://schemas.microsoft.com/office/drawing/2014/main" id="{7C6EAA4A-E67C-4DD9-B453-8E3BB1666BE6}"/>
+              </a:ext>
+            </a:extLst>
+          </p:cNvPr>
+          <p:cNvPicPr>
+            <a:picLocks noChangeAspect="1"/>
+          </p:cNvPicPr>
+          <p:nvPr/>
+        </p:nvPicPr>
+        <p:blipFill>
+          <a:blip r:embed="rId4"/>
+          <a:stretch>
+            <a:fillRect/>
+          </a:stretch>
+        </p:blipFill>
+        <p:spPr>
+          <a:xfrm>
+            <a:off x="4283968" y="3053934"/>
+            <a:ext cx="4032448" cy="3689261"/>
+          </a:xfrm>
+          <a:prstGeom prst="rect">
+            <a:avLst/>
+          </a:prstGeom>
+          <a:ln>
+            <a:solidFill>
+              <a:srgbClr val="C00000"/>
+            </a:solidFill>
+          </a:ln>
+        </p:spPr>
+      </p:pic>
     </p:spTree>
     <p:extLst>
       <p:ext uri="{BB962C8B-B14F-4D97-AF65-F5344CB8AC3E}">
-        <p14:creationId xmlns:p14="http://schemas.microsoft.com/office/powerpoint/2010/main" val="774443681"/>
+        <p14:creationId xmlns:p14="http://schemas.microsoft.com/office/powerpoint/2010/main" val="3192684576"/>
       </p:ext>
     </p:extLst>
   </p:cSld>
@@ -9280,35 +8968,12 @@
         </p:nvSpPr>
         <p:spPr>
           <a:xfrm>
-            <a:off x="0" y="1"/>
-            <a:ext cx="9144000" cy="764704"/>
-          </a:xfrm>
-          <a:gradFill flip="none" rotWithShape="1">
-            <a:gsLst>
-              <a:gs pos="0">
-                <a:srgbClr val="C00000">
-                  <a:shade val="30000"/>
-                  <a:satMod val="115000"/>
-                </a:srgbClr>
-              </a:gs>
-              <a:gs pos="50000">
-                <a:srgbClr val="C00000">
-                  <a:shade val="67500"/>
-                  <a:satMod val="115000"/>
-                </a:srgbClr>
-              </a:gs>
-              <a:gs pos="100000">
-                <a:srgbClr val="C00000">
-                  <a:shade val="100000"/>
-                  <a:satMod val="115000"/>
-                </a:srgbClr>
-              </a:gs>
-            </a:gsLst>
-            <a:path path="circle">
-              <a:fillToRect t="100000" r="100000"/>
-            </a:path>
-            <a:tileRect l="-100000" b="-100000"/>
-          </a:gradFill>
+            <a:off x="0" y="2130425"/>
+            <a:ext cx="9144000" cy="1470025"/>
+          </a:xfrm>
+          <a:solidFill>
+            <a:srgbClr val="00B0F0"/>
+          </a:solidFill>
         </p:spPr>
         <p:txBody>
           <a:bodyPr>
@@ -9316,16 +8981,15 @@
           </a:bodyPr>
           <a:lstStyle/>
           <a:p>
-            <a:pPr algn="l"/>
-            <a:r>
-              <a:rPr lang="en-US" altLang="zh-TW" b="1" dirty="0">
+            <a:r>
+              <a:rPr lang="en-US" altLang="zh-TW" sz="4800" b="1" dirty="0">
                 <a:solidFill>
                   <a:srgbClr val="FFFF00"/>
                 </a:solidFill>
               </a:rPr>
-              <a:t>25.6 Quiz</a:t>
-            </a:r>
-            <a:endParaRPr lang="zh-TW" altLang="en-US" b="1" dirty="0">
+              <a:t>25.7 Quiz</a:t>
+            </a:r>
+            <a:endParaRPr lang="zh-TW" altLang="en-US" sz="4800" b="1" dirty="0">
               <a:solidFill>
                 <a:srgbClr val="FFFF00"/>
               </a:solidFill>
@@ -9335,605 +8999,6 @@
       </p:sp>
       <p:sp>
         <p:nvSpPr>
-          <p:cNvPr id="3" name="副標題 2"/>
-          <p:cNvSpPr>
-            <a:spLocks noGrp="1"/>
-          </p:cNvSpPr>
-          <p:nvPr>
-            <p:ph type="subTitle" idx="1"/>
-          </p:nvPr>
-        </p:nvSpPr>
-        <p:spPr>
-          <a:xfrm>
-            <a:off x="425697" y="1259368"/>
-            <a:ext cx="8106743" cy="4977944"/>
-          </a:xfrm>
-          <a:ln>
-            <a:solidFill>
-              <a:srgbClr val="C00000"/>
-            </a:solidFill>
-          </a:ln>
-        </p:spPr>
-        <p:txBody>
-          <a:bodyPr>
-            <a:noAutofit/>
-          </a:bodyPr>
-          <a:lstStyle/>
-          <a:p>
-            <a:pPr marL="342900" indent="-342900" algn="l">
-              <a:buClr>
-                <a:srgbClr val="0070C0"/>
-              </a:buClr>
-              <a:buSzPct val="80000"/>
-              <a:buFont typeface="Wingdings" pitchFamily="2" charset="2"/>
-              <a:buChar char="u"/>
-            </a:pPr>
-            <a:r>
-              <a:rPr lang="en-US" sz="1800" b="1" dirty="0">
-                <a:solidFill>
-                  <a:schemeClr val="tx1"/>
-                </a:solidFill>
-              </a:rPr>
-              <a:t>Quiz</a:t>
-            </a:r>
-          </a:p>
-          <a:p>
-            <a:pPr marL="342900" indent="-342900" algn="l">
-              <a:buClr>
-                <a:srgbClr val="0070C0"/>
-              </a:buClr>
-              <a:buSzPct val="80000"/>
-              <a:buFont typeface="Wingdings" pitchFamily="2" charset="2"/>
-              <a:buChar char="u"/>
-            </a:pPr>
-            <a:r>
-              <a:rPr lang="en-US" sz="1800" dirty="0">
-                <a:solidFill>
-                  <a:schemeClr val="tx1"/>
-                </a:solidFill>
-              </a:rPr>
-              <a:t>3. What statements for Clean up message and perform vectorization?</a:t>
-            </a:r>
-          </a:p>
-          <a:p>
-            <a:pPr marL="342900" indent="-342900" algn="l">
-              <a:buClr>
-                <a:srgbClr val="0070C0"/>
-              </a:buClr>
-              <a:buSzPct val="80000"/>
-              <a:buFont typeface="Wingdings" pitchFamily="2" charset="2"/>
-              <a:buChar char="u"/>
-            </a:pPr>
-            <a:r>
-              <a:rPr lang="en-US" sz="1800" dirty="0">
-                <a:solidFill>
-                  <a:schemeClr val="tx1"/>
-                </a:solidFill>
-              </a:rPr>
-              <a:t>Ans:</a:t>
-            </a:r>
-          </a:p>
-          <a:p>
-            <a:pPr marL="342900" indent="-342900" algn="l">
-              <a:buClr>
-                <a:srgbClr val="0070C0"/>
-              </a:buClr>
-              <a:buSzPct val="80000"/>
-              <a:buFont typeface="Wingdings" pitchFamily="2" charset="2"/>
-              <a:buChar char="u"/>
-            </a:pPr>
-            <a:r>
-              <a:rPr lang="en-US" sz="1800" dirty="0">
-                <a:solidFill>
-                  <a:schemeClr val="tx1"/>
-                </a:solidFill>
-              </a:rPr>
-              <a:t># clean data by </a:t>
-            </a:r>
-            <a:r>
-              <a:rPr lang="en-US" sz="1800" dirty="0" err="1">
-                <a:solidFill>
-                  <a:schemeClr val="tx1"/>
-                </a:solidFill>
-              </a:rPr>
-              <a:t>fit_tranform</a:t>
-            </a:r>
-            <a:r>
-              <a:rPr lang="en-US" sz="1800" dirty="0">
-                <a:solidFill>
-                  <a:schemeClr val="tx1"/>
-                </a:solidFill>
-              </a:rPr>
-              <a:t>(data['msg’])</a:t>
-            </a:r>
-          </a:p>
-          <a:p>
-            <a:pPr marL="342900" indent="-342900" algn="l">
-              <a:buClr>
-                <a:srgbClr val="0070C0"/>
-              </a:buClr>
-              <a:buSzPct val="80000"/>
-              <a:buFont typeface="Wingdings" pitchFamily="2" charset="2"/>
-              <a:buChar char="u"/>
-            </a:pPr>
-            <a:r>
-              <a:rPr lang="en-US" sz="1800" dirty="0">
-                <a:solidFill>
-                  <a:schemeClr val="tx1"/>
-                </a:solidFill>
-              </a:rPr>
-              <a:t>def </a:t>
-            </a:r>
-            <a:r>
-              <a:rPr lang="en-US" sz="1800" dirty="0" err="1">
-                <a:solidFill>
-                  <a:schemeClr val="tx1"/>
-                </a:solidFill>
-              </a:rPr>
-              <a:t>clean_text</a:t>
-            </a:r>
-            <a:r>
-              <a:rPr lang="en-US" sz="1800" dirty="0">
-                <a:solidFill>
-                  <a:schemeClr val="tx1"/>
-                </a:solidFill>
-              </a:rPr>
-              <a:t>(txt):</a:t>
-            </a:r>
-          </a:p>
-          <a:p>
-            <a:pPr marL="342900" indent="-342900" algn="l">
-              <a:buClr>
-                <a:srgbClr val="0070C0"/>
-              </a:buClr>
-              <a:buSzPct val="80000"/>
-              <a:buFont typeface="Wingdings" pitchFamily="2" charset="2"/>
-              <a:buChar char="u"/>
-            </a:pPr>
-            <a:r>
-              <a:rPr lang="en-US" sz="1800" dirty="0">
-                <a:solidFill>
-                  <a:schemeClr val="tx1"/>
-                </a:solidFill>
-              </a:rPr>
-              <a:t>    #print ('</a:t>
-            </a:r>
-            <a:r>
-              <a:rPr lang="en-US" sz="1800" dirty="0" err="1">
-                <a:solidFill>
-                  <a:schemeClr val="tx1"/>
-                </a:solidFill>
-              </a:rPr>
-              <a:t>clean_text</a:t>
-            </a:r>
-            <a:r>
-              <a:rPr lang="en-US" sz="1800" dirty="0">
-                <a:solidFill>
-                  <a:schemeClr val="tx1"/>
-                </a:solidFill>
-              </a:rPr>
-              <a:t>:', txt)</a:t>
-            </a:r>
-          </a:p>
-          <a:p>
-            <a:pPr marL="342900" indent="-342900" algn="l">
-              <a:buClr>
-                <a:srgbClr val="0070C0"/>
-              </a:buClr>
-              <a:buSzPct val="80000"/>
-              <a:buFont typeface="Wingdings" pitchFamily="2" charset="2"/>
-              <a:buChar char="u"/>
-            </a:pPr>
-            <a:r>
-              <a:rPr lang="en-US" sz="1800" dirty="0">
-                <a:solidFill>
-                  <a:schemeClr val="tx1"/>
-                </a:solidFill>
-              </a:rPr>
-              <a:t>    txt = "".join([c for c in txt if c not in </a:t>
-            </a:r>
-            <a:r>
-              <a:rPr lang="en-US" sz="1800" dirty="0" err="1">
-                <a:solidFill>
-                  <a:schemeClr val="tx1"/>
-                </a:solidFill>
-              </a:rPr>
-              <a:t>string.punctuation</a:t>
-            </a:r>
-            <a:r>
-              <a:rPr lang="en-US" sz="1800" dirty="0">
-                <a:solidFill>
-                  <a:schemeClr val="tx1"/>
-                </a:solidFill>
-              </a:rPr>
-              <a:t>])</a:t>
-            </a:r>
-          </a:p>
-          <a:p>
-            <a:pPr marL="342900" indent="-342900" algn="l">
-              <a:buClr>
-                <a:srgbClr val="0070C0"/>
-              </a:buClr>
-              <a:buSzPct val="80000"/>
-              <a:buFont typeface="Wingdings" pitchFamily="2" charset="2"/>
-              <a:buChar char="u"/>
-            </a:pPr>
-            <a:r>
-              <a:rPr lang="en-US" sz="1800" dirty="0">
-                <a:solidFill>
-                  <a:schemeClr val="tx1"/>
-                </a:solidFill>
-              </a:rPr>
-              <a:t>    tokens = </a:t>
-            </a:r>
-            <a:r>
-              <a:rPr lang="en-US" sz="1800" dirty="0" err="1">
-                <a:solidFill>
-                  <a:schemeClr val="tx1"/>
-                </a:solidFill>
-              </a:rPr>
-              <a:t>re.split</a:t>
-            </a:r>
-            <a:r>
-              <a:rPr lang="en-US" sz="1800" dirty="0">
-                <a:solidFill>
-                  <a:schemeClr val="tx1"/>
-                </a:solidFill>
-              </a:rPr>
-              <a:t>('\W+', txt)</a:t>
-            </a:r>
-          </a:p>
-          <a:p>
-            <a:pPr marL="342900" indent="-342900" algn="l">
-              <a:buClr>
-                <a:srgbClr val="0070C0"/>
-              </a:buClr>
-              <a:buSzPct val="80000"/>
-              <a:buFont typeface="Wingdings" pitchFamily="2" charset="2"/>
-              <a:buChar char="u"/>
-            </a:pPr>
-            <a:r>
-              <a:rPr lang="en-US" sz="1800" dirty="0">
-                <a:solidFill>
-                  <a:schemeClr val="tx1"/>
-                </a:solidFill>
-              </a:rPr>
-              <a:t>    txt = [</a:t>
-            </a:r>
-            <a:r>
-              <a:rPr lang="en-US" sz="1800" dirty="0" err="1">
-                <a:solidFill>
-                  <a:schemeClr val="tx1"/>
-                </a:solidFill>
-              </a:rPr>
-              <a:t>ps.stem</a:t>
-            </a:r>
-            <a:r>
-              <a:rPr lang="en-US" sz="1800" dirty="0">
-                <a:solidFill>
-                  <a:schemeClr val="tx1"/>
-                </a:solidFill>
-              </a:rPr>
-              <a:t>(word) for word in tokens if word not in </a:t>
-            </a:r>
-            <a:r>
-              <a:rPr lang="en-US" sz="1800" dirty="0" err="1">
-                <a:solidFill>
-                  <a:schemeClr val="tx1"/>
-                </a:solidFill>
-              </a:rPr>
-              <a:t>stopwords</a:t>
-            </a:r>
-            <a:r>
-              <a:rPr lang="en-US" sz="1800" dirty="0">
-                <a:solidFill>
-                  <a:schemeClr val="tx1"/>
-                </a:solidFill>
-              </a:rPr>
-              <a:t>]</a:t>
-            </a:r>
-          </a:p>
-          <a:p>
-            <a:pPr marL="342900" indent="-342900" algn="l">
-              <a:buClr>
-                <a:srgbClr val="0070C0"/>
-              </a:buClr>
-              <a:buSzPct val="80000"/>
-              <a:buFont typeface="Wingdings" pitchFamily="2" charset="2"/>
-              <a:buChar char="u"/>
-            </a:pPr>
-            <a:r>
-              <a:rPr lang="en-US" sz="1800" dirty="0">
-                <a:solidFill>
-                  <a:schemeClr val="tx1"/>
-                </a:solidFill>
-              </a:rPr>
-              <a:t>    return txt</a:t>
-            </a:r>
-          </a:p>
-          <a:p>
-            <a:pPr marL="342900" indent="-342900" algn="l">
-              <a:buClr>
-                <a:srgbClr val="0070C0"/>
-              </a:buClr>
-              <a:buSzPct val="80000"/>
-              <a:buFont typeface="Wingdings" pitchFamily="2" charset="2"/>
-              <a:buChar char="u"/>
-            </a:pPr>
-            <a:r>
-              <a:rPr lang="en-US" sz="1800" dirty="0">
-                <a:solidFill>
-                  <a:schemeClr val="tx1"/>
-                </a:solidFill>
-              </a:rPr>
-              <a:t># </a:t>
-            </a:r>
-          </a:p>
-          <a:p>
-            <a:pPr marL="342900" indent="-342900" algn="l">
-              <a:buClr>
-                <a:srgbClr val="0070C0"/>
-              </a:buClr>
-              <a:buSzPct val="80000"/>
-              <a:buFont typeface="Wingdings" pitchFamily="2" charset="2"/>
-              <a:buChar char="u"/>
-            </a:pPr>
-            <a:r>
-              <a:rPr lang="en-US" sz="1800" dirty="0">
-                <a:solidFill>
-                  <a:schemeClr val="tx1"/>
-                </a:solidFill>
-              </a:rPr>
-              <a:t>from </a:t>
-            </a:r>
-            <a:r>
-              <a:rPr lang="en-US" sz="1800" dirty="0" err="1">
-                <a:solidFill>
-                  <a:schemeClr val="tx1"/>
-                </a:solidFill>
-              </a:rPr>
-              <a:t>sklearn.feature_extraction.text</a:t>
-            </a:r>
-            <a:r>
-              <a:rPr lang="en-US" sz="1800" dirty="0">
-                <a:solidFill>
-                  <a:schemeClr val="tx1"/>
-                </a:solidFill>
-              </a:rPr>
-              <a:t> import </a:t>
-            </a:r>
-            <a:r>
-              <a:rPr lang="en-US" sz="1800" dirty="0" err="1">
-                <a:solidFill>
-                  <a:schemeClr val="tx1"/>
-                </a:solidFill>
-              </a:rPr>
-              <a:t>TfidfVectorizer</a:t>
-            </a:r>
-            <a:endParaRPr lang="en-US" sz="1800" dirty="0">
-              <a:solidFill>
-                <a:schemeClr val="tx1"/>
-              </a:solidFill>
-            </a:endParaRPr>
-          </a:p>
-          <a:p>
-            <a:pPr marL="342900" indent="-342900" algn="l">
-              <a:buClr>
-                <a:srgbClr val="0070C0"/>
-              </a:buClr>
-              <a:buSzPct val="80000"/>
-              <a:buFont typeface="Wingdings" pitchFamily="2" charset="2"/>
-              <a:buChar char="u"/>
-            </a:pPr>
-            <a:r>
-              <a:rPr lang="en-US" sz="1800" dirty="0" err="1">
-                <a:solidFill>
-                  <a:schemeClr val="tx1"/>
-                </a:solidFill>
-              </a:rPr>
-              <a:t>tfidf</a:t>
-            </a:r>
-            <a:r>
-              <a:rPr lang="en-US" sz="1800" dirty="0">
-                <a:solidFill>
-                  <a:schemeClr val="tx1"/>
-                </a:solidFill>
-              </a:rPr>
-              <a:t> = </a:t>
-            </a:r>
-            <a:r>
-              <a:rPr lang="en-US" sz="1800" dirty="0" err="1">
-                <a:solidFill>
-                  <a:schemeClr val="tx1"/>
-                </a:solidFill>
-              </a:rPr>
-              <a:t>TfidfVectorizer</a:t>
-            </a:r>
-            <a:r>
-              <a:rPr lang="en-US" sz="1800" dirty="0">
-                <a:solidFill>
-                  <a:schemeClr val="tx1"/>
-                </a:solidFill>
-              </a:rPr>
-              <a:t>(analyzer=</a:t>
-            </a:r>
-            <a:r>
-              <a:rPr lang="en-US" sz="1800" dirty="0" err="1">
-                <a:solidFill>
-                  <a:schemeClr val="tx1"/>
-                </a:solidFill>
-              </a:rPr>
-              <a:t>clean_text</a:t>
-            </a:r>
-            <a:r>
-              <a:rPr lang="en-US" sz="1800" dirty="0">
-                <a:solidFill>
-                  <a:schemeClr val="tx1"/>
-                </a:solidFill>
-              </a:rPr>
-              <a:t>) </a:t>
-            </a:r>
-          </a:p>
-          <a:p>
-            <a:pPr marL="342900" indent="-342900" algn="l">
-              <a:buClr>
-                <a:srgbClr val="0070C0"/>
-              </a:buClr>
-              <a:buSzPct val="80000"/>
-              <a:buFont typeface="Wingdings" pitchFamily="2" charset="2"/>
-              <a:buChar char="u"/>
-            </a:pPr>
-            <a:r>
-              <a:rPr lang="en-US" sz="1800" dirty="0">
-                <a:solidFill>
-                  <a:schemeClr val="tx1"/>
-                </a:solidFill>
-              </a:rPr>
-              <a:t># The </a:t>
-            </a:r>
-            <a:r>
-              <a:rPr lang="en-US" sz="1800" dirty="0" err="1">
-                <a:solidFill>
-                  <a:schemeClr val="tx1"/>
-                </a:solidFill>
-              </a:rPr>
-              <a:t>fit_transform</a:t>
-            </a:r>
-            <a:r>
-              <a:rPr lang="en-US" sz="1800" dirty="0">
-                <a:solidFill>
-                  <a:schemeClr val="tx1"/>
-                </a:solidFill>
-              </a:rPr>
-              <a:t> trigger the </a:t>
-            </a:r>
-            <a:r>
-              <a:rPr lang="en-US" sz="1800" dirty="0" err="1">
-                <a:solidFill>
-                  <a:schemeClr val="tx1"/>
-                </a:solidFill>
-              </a:rPr>
-              <a:t>clean_text</a:t>
-            </a:r>
-            <a:r>
-              <a:rPr lang="en-US" sz="1800" dirty="0">
-                <a:solidFill>
-                  <a:schemeClr val="tx1"/>
-                </a:solidFill>
-              </a:rPr>
-              <a:t> and data['msg’]</a:t>
-            </a:r>
-          </a:p>
-          <a:p>
-            <a:pPr marL="342900" indent="-342900" algn="l">
-              <a:buClr>
-                <a:srgbClr val="0070C0"/>
-              </a:buClr>
-              <a:buSzPct val="80000"/>
-              <a:buFont typeface="Wingdings" pitchFamily="2" charset="2"/>
-              <a:buChar char="u"/>
-            </a:pPr>
-            <a:r>
-              <a:rPr lang="en-US" sz="1800" dirty="0" err="1">
-                <a:solidFill>
-                  <a:schemeClr val="tx1"/>
-                </a:solidFill>
-              </a:rPr>
-              <a:t>X_tfidf</a:t>
-            </a:r>
-            <a:r>
-              <a:rPr lang="en-US" sz="1800" dirty="0">
-                <a:solidFill>
-                  <a:schemeClr val="tx1"/>
-                </a:solidFill>
-              </a:rPr>
-              <a:t> = </a:t>
-            </a:r>
-            <a:r>
-              <a:rPr lang="en-US" sz="1800" dirty="0" err="1">
-                <a:solidFill>
-                  <a:schemeClr val="tx1"/>
-                </a:solidFill>
-              </a:rPr>
-              <a:t>tfidf.fit_transform</a:t>
-            </a:r>
-            <a:r>
-              <a:rPr lang="en-US" sz="1800" dirty="0">
-                <a:solidFill>
-                  <a:schemeClr val="tx1"/>
-                </a:solidFill>
-              </a:rPr>
-              <a:t>(data['msg'])</a:t>
-            </a:r>
-          </a:p>
-        </p:txBody>
-      </p:sp>
-      <p:sp>
-        <p:nvSpPr>
-          <p:cNvPr id="4" name="標題 1"/>
-          <p:cNvSpPr txBox="1">
-            <a:spLocks/>
-          </p:cNvSpPr>
-          <p:nvPr/>
-        </p:nvSpPr>
-        <p:spPr>
-          <a:xfrm>
-            <a:off x="0" y="764704"/>
-            <a:ext cx="9144000" cy="360040"/>
-          </a:xfrm>
-          <a:prstGeom prst="rect">
-            <a:avLst/>
-          </a:prstGeom>
-          <a:gradFill flip="none" rotWithShape="1">
-            <a:gsLst>
-              <a:gs pos="0">
-                <a:srgbClr val="00B0F0">
-                  <a:shade val="30000"/>
-                  <a:satMod val="115000"/>
-                </a:srgbClr>
-              </a:gs>
-              <a:gs pos="50000">
-                <a:srgbClr val="00B0F0">
-                  <a:shade val="67500"/>
-                  <a:satMod val="115000"/>
-                </a:srgbClr>
-              </a:gs>
-              <a:gs pos="100000">
-                <a:srgbClr val="00B0F0">
-                  <a:shade val="100000"/>
-                  <a:satMod val="115000"/>
-                </a:srgbClr>
-              </a:gs>
-            </a:gsLst>
-            <a:path path="circle">
-              <a:fillToRect t="100000" r="100000"/>
-            </a:path>
-            <a:tileRect l="-100000" b="-100000"/>
-          </a:gradFill>
-        </p:spPr>
-        <p:txBody>
-          <a:bodyPr vert="horz" lIns="91440" tIns="45720" rIns="91440" bIns="45720" rtlCol="0" anchor="ctr">
-            <a:normAutofit fontScale="85000" lnSpcReduction="10000"/>
-          </a:bodyPr>
-          <a:lstStyle/>
-          <a:p>
-            <a:pPr lvl="0">
-              <a:spcBef>
-                <a:spcPct val="0"/>
-              </a:spcBef>
-            </a:pPr>
-            <a:r>
-              <a:rPr lang="en-US" sz="1600" dirty="0">
-                <a:hlinkClick r:id="rId2"/>
-              </a:rPr>
-              <a:t>https://www.udemy.com/course/natural-language-processingnlp-with-python-and-nltk/learn/lecture/16695134#overview</a:t>
-            </a:r>
-            <a:endParaRPr lang="zh-TW" altLang="en-US" sz="1600" dirty="0"/>
-          </a:p>
-        </p:txBody>
-      </p:sp>
-      <p:sp>
-        <p:nvSpPr>
           <p:cNvPr id="5" name="日期版面配置區 4"/>
           <p:cNvSpPr>
             <a:spLocks noGrp="1"/>
@@ -9947,7 +9012,7 @@
           <a:bodyPr/>
           <a:lstStyle/>
           <a:p>
-            <a:fld id="{A4F910E6-8D00-4BAF-8C48-9688E0B449D3}" type="datetime1">
+            <a:fld id="{C389EDC9-19E3-47AC-9C57-C6A24DEA81AD}" type="datetime1">
               <a:rPr lang="zh-TW" altLang="en-US" smtClean="0"/>
               <a:pPr/>
               <a:t>2020/6/21</a:t>
@@ -9980,10 +9045,40 @@
           </a:p>
         </p:txBody>
       </p:sp>
+      <p:pic>
+        <p:nvPicPr>
+          <p:cNvPr id="7" name="Picture 6">
+            <a:extLst>
+              <a:ext uri="{FF2B5EF4-FFF2-40B4-BE49-F238E27FC236}">
+                <a16:creationId xmlns:a16="http://schemas.microsoft.com/office/drawing/2014/main" id="{1BE488C5-DA27-405E-9F7E-A4EF5DF95762}"/>
+              </a:ext>
+            </a:extLst>
+          </p:cNvPr>
+          <p:cNvPicPr>
+            <a:picLocks noChangeAspect="1"/>
+          </p:cNvPicPr>
+          <p:nvPr/>
+        </p:nvPicPr>
+        <p:blipFill>
+          <a:blip r:embed="rId2"/>
+          <a:stretch>
+            <a:fillRect/>
+          </a:stretch>
+        </p:blipFill>
+        <p:spPr>
+          <a:xfrm>
+            <a:off x="3923928" y="3695964"/>
+            <a:ext cx="1004960" cy="885164"/>
+          </a:xfrm>
+          <a:prstGeom prst="rect">
+            <a:avLst/>
+          </a:prstGeom>
+        </p:spPr>
+      </p:pic>
     </p:spTree>
     <p:extLst>
       <p:ext uri="{BB962C8B-B14F-4D97-AF65-F5344CB8AC3E}">
-        <p14:creationId xmlns:p14="http://schemas.microsoft.com/office/powerpoint/2010/main" val="3435755650"/>
+        <p14:creationId xmlns:p14="http://schemas.microsoft.com/office/powerpoint/2010/main" val="3271172281"/>
       </p:ext>
     </p:extLst>
   </p:cSld>
@@ -11019,7 +10114,7 @@
                   <a:srgbClr val="FFFF00"/>
                 </a:solidFill>
               </a:rPr>
-              <a:t>25.6 Quiz</a:t>
+              <a:t>25.7 Quiz</a:t>
             </a:r>
             <a:endParaRPr lang="zh-TW" altLang="en-US" b="1" dirty="0">
               <a:solidFill>
@@ -11042,7 +10137,7 @@
         <p:spPr>
           <a:xfrm>
             <a:off x="425697" y="1259368"/>
-            <a:ext cx="8106743" cy="1665576"/>
+            <a:ext cx="8106743" cy="4401880"/>
           </a:xfrm>
           <a:ln>
             <a:solidFill>
@@ -11088,23 +10183,7 @@
                   <a:schemeClr val="tx1"/>
                 </a:solidFill>
               </a:rPr>
-              <a:t>4. What statements for Combine message length, </a:t>
-            </a:r>
-            <a:r>
-              <a:rPr lang="en-US" sz="1800" dirty="0" err="1">
-                <a:solidFill>
-                  <a:schemeClr val="tx1"/>
-                </a:solidFill>
-              </a:rPr>
-              <a:t>punctionation</a:t>
-            </a:r>
-            <a:r>
-              <a:rPr lang="en-US" sz="1800" dirty="0">
-                <a:solidFill>
-                  <a:schemeClr val="tx1"/>
-                </a:solidFill>
-              </a:rPr>
-              <a:t>%, and X ?</a:t>
+              <a:t>1. What statements for read text and put label?</a:t>
             </a:r>
           </a:p>
           <a:p>
@@ -11140,7 +10219,7 @@
                   <a:schemeClr val="tx1"/>
                 </a:solidFill>
               </a:rPr>
-              <a:t>X = </a:t>
+              <a:t>data = </a:t>
             </a:r>
             <a:r>
               <a:rPr lang="en-US" sz="1800" dirty="0" err="1">
@@ -11148,7 +10227,7 @@
                   <a:schemeClr val="tx1"/>
                 </a:solidFill>
               </a:rPr>
-              <a:t>pd.concat</a:t>
+              <a:t>pd.read_csv</a:t>
             </a:r>
             <a:r>
               <a:rPr lang="en-US" sz="1800" dirty="0">
@@ -11156,7 +10235,7 @@
                   <a:schemeClr val="tx1"/>
                 </a:solidFill>
               </a:rPr>
-              <a:t> ([data['</a:t>
+              <a:t>('../data/</a:t>
             </a:r>
             <a:r>
               <a:rPr lang="en-US" sz="1800" dirty="0" err="1">
@@ -11164,7 +10243,7 @@
                   <a:schemeClr val="tx1"/>
                 </a:solidFill>
               </a:rPr>
-              <a:t>msg_len</a:t>
+              <a:t>smsspamcollection</a:t>
             </a:r>
             <a:r>
               <a:rPr lang="en-US" sz="1800" dirty="0">
@@ -11172,7 +10251,23 @@
                   <a:schemeClr val="tx1"/>
                 </a:solidFill>
               </a:rPr>
-              <a:t>'], data['punctuation_%'], \</a:t>
+              <a:t>/</a:t>
+            </a:r>
+            <a:r>
+              <a:rPr lang="en-US" sz="1800" dirty="0" err="1">
+                <a:solidFill>
+                  <a:schemeClr val="tx1"/>
+                </a:solidFill>
+              </a:rPr>
+              <a:t>SMSSpamCollection</a:t>
+            </a:r>
+            <a:r>
+              <a:rPr lang="en-US" sz="1800" dirty="0">
+                <a:solidFill>
+                  <a:schemeClr val="tx1"/>
+                </a:solidFill>
+              </a:rPr>
+              <a:t>’, \</a:t>
             </a:r>
           </a:p>
           <a:p>
@@ -11198,7 +10293,7 @@
                   <a:schemeClr val="tx1"/>
                 </a:solidFill>
               </a:rPr>
-              <a:t>pd.DataFrame</a:t>
+              <a:t>sep</a:t>
             </a:r>
             <a:r>
               <a:rPr lang="en-US" sz="1800" dirty="0">
@@ -11206,15 +10301,25 @@
                   <a:schemeClr val="tx1"/>
                 </a:solidFill>
               </a:rPr>
-              <a:t>(</a:t>
-            </a:r>
+              <a:t>='\t', header=None)</a:t>
+            </a:r>
+          </a:p>
+          <a:p>
+            <a:pPr marL="342900" indent="-342900" algn="l">
+              <a:buClr>
+                <a:srgbClr val="0070C0"/>
+              </a:buClr>
+              <a:buSzPct val="80000"/>
+              <a:buFont typeface="Wingdings" pitchFamily="2" charset="2"/>
+              <a:buChar char="u"/>
+            </a:pPr>
             <a:r>
               <a:rPr lang="en-US" sz="1800" dirty="0" err="1">
                 <a:solidFill>
                   <a:schemeClr val="tx1"/>
                 </a:solidFill>
               </a:rPr>
-              <a:t>X_tfidf.toarray</a:t>
+              <a:t>data.columns</a:t>
             </a:r>
             <a:r>
               <a:rPr lang="en-US" sz="1800" dirty="0">
@@ -11222,7 +10327,229 @@
                   <a:schemeClr val="tx1"/>
                 </a:solidFill>
               </a:rPr>
-              <a:t>())], axis=1)</a:t>
+              <a:t> = ['label', 'msg’]</a:t>
+            </a:r>
+          </a:p>
+          <a:p>
+            <a:pPr marL="342900" indent="-342900" algn="l">
+              <a:buClr>
+                <a:srgbClr val="0070C0"/>
+              </a:buClr>
+              <a:buSzPct val="80000"/>
+              <a:buFont typeface="Wingdings" pitchFamily="2" charset="2"/>
+              <a:buChar char="u"/>
+            </a:pPr>
+            <a:r>
+              <a:rPr lang="en-US" sz="1800" dirty="0">
+                <a:solidFill>
+                  <a:schemeClr val="tx1"/>
+                </a:solidFill>
+              </a:rPr>
+              <a:t>2. What statements for add features of message length and punctuation %?</a:t>
+            </a:r>
+          </a:p>
+          <a:p>
+            <a:pPr marL="342900" indent="-342900" algn="l">
+              <a:buClr>
+                <a:srgbClr val="0070C0"/>
+              </a:buClr>
+              <a:buSzPct val="80000"/>
+              <a:buFont typeface="Wingdings" pitchFamily="2" charset="2"/>
+              <a:buChar char="u"/>
+            </a:pPr>
+            <a:r>
+              <a:rPr lang="en-US" sz="1800" dirty="0">
+                <a:solidFill>
+                  <a:schemeClr val="tx1"/>
+                </a:solidFill>
+              </a:rPr>
+              <a:t>Ans:</a:t>
+            </a:r>
+          </a:p>
+          <a:p>
+            <a:pPr marL="342900" indent="-342900" algn="l">
+              <a:buClr>
+                <a:srgbClr val="0070C0"/>
+              </a:buClr>
+              <a:buSzPct val="80000"/>
+              <a:buFont typeface="Wingdings" pitchFamily="2" charset="2"/>
+              <a:buChar char="u"/>
+            </a:pPr>
+            <a:r>
+              <a:rPr lang="en-US" sz="1800" dirty="0">
+                <a:solidFill>
+                  <a:schemeClr val="tx1"/>
+                </a:solidFill>
+              </a:rPr>
+              <a:t>def </a:t>
+            </a:r>
+            <a:r>
+              <a:rPr lang="en-US" sz="1800" dirty="0" err="1">
+                <a:solidFill>
+                  <a:schemeClr val="tx1"/>
+                </a:solidFill>
+              </a:rPr>
+              <a:t>punctuation_count</a:t>
+            </a:r>
+            <a:r>
+              <a:rPr lang="en-US" sz="1800" dirty="0">
+                <a:solidFill>
+                  <a:schemeClr val="tx1"/>
+                </a:solidFill>
+              </a:rPr>
+              <a:t>(txt):</a:t>
+            </a:r>
+          </a:p>
+          <a:p>
+            <a:pPr marL="342900" indent="-342900" algn="l">
+              <a:buClr>
+                <a:srgbClr val="0070C0"/>
+              </a:buClr>
+              <a:buSzPct val="80000"/>
+              <a:buFont typeface="Wingdings" pitchFamily="2" charset="2"/>
+              <a:buChar char="u"/>
+            </a:pPr>
+            <a:r>
+              <a:rPr lang="en-US" sz="1800" dirty="0">
+                <a:solidFill>
+                  <a:schemeClr val="tx1"/>
+                </a:solidFill>
+              </a:rPr>
+              <a:t>    count = sum ([1 for c in txt if c in </a:t>
+            </a:r>
+            <a:r>
+              <a:rPr lang="en-US" sz="1800" dirty="0" err="1">
+                <a:solidFill>
+                  <a:schemeClr val="tx1"/>
+                </a:solidFill>
+              </a:rPr>
+              <a:t>string.punctuation</a:t>
+            </a:r>
+            <a:r>
+              <a:rPr lang="en-US" sz="1800" dirty="0">
+                <a:solidFill>
+                  <a:schemeClr val="tx1"/>
+                </a:solidFill>
+              </a:rPr>
+              <a:t>])</a:t>
+            </a:r>
+          </a:p>
+          <a:p>
+            <a:pPr marL="342900" indent="-342900" algn="l">
+              <a:buClr>
+                <a:srgbClr val="0070C0"/>
+              </a:buClr>
+              <a:buSzPct val="80000"/>
+              <a:buFont typeface="Wingdings" pitchFamily="2" charset="2"/>
+              <a:buChar char="u"/>
+            </a:pPr>
+            <a:r>
+              <a:rPr lang="en-US" sz="1800" dirty="0">
+                <a:solidFill>
+                  <a:schemeClr val="tx1"/>
+                </a:solidFill>
+              </a:rPr>
+              <a:t>    return 100*count/</a:t>
+            </a:r>
+            <a:r>
+              <a:rPr lang="en-US" sz="1800" dirty="0" err="1">
+                <a:solidFill>
+                  <a:schemeClr val="tx1"/>
+                </a:solidFill>
+              </a:rPr>
+              <a:t>len</a:t>
+            </a:r>
+            <a:r>
+              <a:rPr lang="en-US" sz="1800" dirty="0">
+                <a:solidFill>
+                  <a:schemeClr val="tx1"/>
+                </a:solidFill>
+              </a:rPr>
+              <a:t>(txt)</a:t>
+            </a:r>
+          </a:p>
+          <a:p>
+            <a:pPr marL="342900" indent="-342900" algn="l">
+              <a:buClr>
+                <a:srgbClr val="0070C0"/>
+              </a:buClr>
+              <a:buSzPct val="80000"/>
+              <a:buFont typeface="Wingdings" pitchFamily="2" charset="2"/>
+              <a:buChar char="u"/>
+            </a:pPr>
+            <a:r>
+              <a:rPr lang="en-US" sz="1800" dirty="0">
+                <a:solidFill>
+                  <a:schemeClr val="tx1"/>
+                </a:solidFill>
+              </a:rPr>
+              <a:t>data['</a:t>
+            </a:r>
+            <a:r>
+              <a:rPr lang="en-US" sz="1800" dirty="0" err="1">
+                <a:solidFill>
+                  <a:schemeClr val="tx1"/>
+                </a:solidFill>
+              </a:rPr>
+              <a:t>msg_len</a:t>
+            </a:r>
+            <a:r>
+              <a:rPr lang="en-US" sz="1800" dirty="0">
+                <a:solidFill>
+                  <a:schemeClr val="tx1"/>
+                </a:solidFill>
+              </a:rPr>
+              <a:t>'] = data['msg'].apply(lambda x: </a:t>
+            </a:r>
+            <a:r>
+              <a:rPr lang="en-US" sz="1800" dirty="0" err="1">
+                <a:solidFill>
+                  <a:schemeClr val="tx1"/>
+                </a:solidFill>
+              </a:rPr>
+              <a:t>len</a:t>
+            </a:r>
+            <a:r>
+              <a:rPr lang="en-US" sz="1800" dirty="0">
+                <a:solidFill>
+                  <a:schemeClr val="tx1"/>
+                </a:solidFill>
+              </a:rPr>
+              <a:t>(x))</a:t>
+            </a:r>
+          </a:p>
+          <a:p>
+            <a:pPr marL="342900" indent="-342900" algn="l">
+              <a:buClr>
+                <a:srgbClr val="0070C0"/>
+              </a:buClr>
+              <a:buSzPct val="80000"/>
+              <a:buFont typeface="Wingdings" pitchFamily="2" charset="2"/>
+              <a:buChar char="u"/>
+            </a:pPr>
+            <a:r>
+              <a:rPr lang="en-US" sz="1800" dirty="0">
+                <a:solidFill>
+                  <a:schemeClr val="tx1"/>
+                </a:solidFill>
+              </a:rPr>
+              <a:t>data['punctuation_%'] = data['msg'].apply (lambda x: </a:t>
+            </a:r>
+            <a:r>
+              <a:rPr lang="en-US" sz="1800" dirty="0" err="1">
+                <a:solidFill>
+                  <a:schemeClr val="tx1"/>
+                </a:solidFill>
+              </a:rPr>
+              <a:t>punctuation_count</a:t>
+            </a:r>
+            <a:r>
+              <a:rPr lang="en-US" sz="1800" dirty="0">
+                <a:solidFill>
+                  <a:schemeClr val="tx1"/>
+                </a:solidFill>
+              </a:rPr>
+              <a:t>(x))</a:t>
             </a:r>
           </a:p>
         </p:txBody>
@@ -11342,7 +10669,7 @@
     </p:spTree>
     <p:extLst>
       <p:ext uri="{BB962C8B-B14F-4D97-AF65-F5344CB8AC3E}">
-        <p14:creationId xmlns:p14="http://schemas.microsoft.com/office/powerpoint/2010/main" val="495369245"/>
+        <p14:creationId xmlns:p14="http://schemas.microsoft.com/office/powerpoint/2010/main" val="774443681"/>
       </p:ext>
     </p:extLst>
   </p:cSld>
@@ -11424,7 +10751,7 @@
                   <a:srgbClr val="FFFF00"/>
                 </a:solidFill>
               </a:rPr>
-              <a:t>25.6 Quiz</a:t>
+              <a:t>25.7 Quiz</a:t>
             </a:r>
             <a:endParaRPr lang="zh-TW" altLang="en-US" b="1" dirty="0">
               <a:solidFill>
@@ -11447,7 +10774,7 @@
         <p:spPr>
           <a:xfrm>
             <a:off x="425697" y="1259368"/>
-            <a:ext cx="8106743" cy="2241640"/>
+            <a:ext cx="8106743" cy="4977944"/>
           </a:xfrm>
           <a:ln>
             <a:solidFill>
@@ -11493,23 +10820,7 @@
                   <a:schemeClr val="tx1"/>
                 </a:solidFill>
               </a:rPr>
-              <a:t>4. What statements for repeat 5 </a:t>
-            </a:r>
-            <a:r>
-              <a:rPr lang="en-US" sz="1800">
-                <a:solidFill>
-                  <a:schemeClr val="tx1"/>
-                </a:solidFill>
-              </a:rPr>
-              <a:t>times of Random </a:t>
-            </a:r>
-            <a:r>
-              <a:rPr lang="en-US" sz="1800" dirty="0">
-                <a:solidFill>
-                  <a:schemeClr val="tx1"/>
-                </a:solidFill>
-              </a:rPr>
-              <a:t>Forest Classifier and Cross-Validation?</a:t>
+              <a:t>3. What statements for Clean up message and perform vectorization?</a:t>
             </a:r>
           </a:p>
           <a:p>
@@ -11545,7 +10856,7 @@
                   <a:schemeClr val="tx1"/>
                 </a:solidFill>
               </a:rPr>
-              <a:t>from </a:t>
+              <a:t># clean data by </a:t>
             </a:r>
             <a:r>
               <a:rPr lang="en-US" sz="1800" dirty="0" err="1">
@@ -11553,7 +10864,7 @@
                   <a:schemeClr val="tx1"/>
                 </a:solidFill>
               </a:rPr>
-              <a:t>sklearn.model_selection</a:t>
+              <a:t>fit_tranform</a:t>
             </a:r>
             <a:r>
               <a:rPr lang="en-US" sz="1800" dirty="0">
@@ -11561,37 +10872,8 @@
                   <a:schemeClr val="tx1"/>
                 </a:solidFill>
               </a:rPr>
-              <a:t> import </a:t>
-            </a:r>
-            <a:r>
-              <a:rPr lang="en-US" sz="1800" dirty="0" err="1">
-                <a:solidFill>
-                  <a:schemeClr val="tx1"/>
-                </a:solidFill>
-              </a:rPr>
-              <a:t>KFold</a:t>
-            </a:r>
-            <a:r>
-              <a:rPr lang="en-US" sz="1800" dirty="0">
-                <a:solidFill>
-                  <a:schemeClr val="tx1"/>
-                </a:solidFill>
-              </a:rPr>
-              <a:t>, </a:t>
-            </a:r>
-            <a:r>
-              <a:rPr lang="en-US" sz="1800" dirty="0" err="1">
-                <a:solidFill>
-                  <a:schemeClr val="tx1"/>
-                </a:solidFill>
-              </a:rPr>
-              <a:t>cross_val_score</a:t>
-            </a:r>
-            <a:endParaRPr lang="en-US" sz="1800" dirty="0">
-              <a:solidFill>
-                <a:schemeClr val="tx1"/>
-              </a:solidFill>
-            </a:endParaRPr>
+              <a:t>(data['msg’])</a:t>
+            </a:r>
           </a:p>
           <a:p>
             <a:pPr marL="342900" indent="-342900" algn="l">
@@ -11603,12 +10885,20 @@
               <a:buChar char="u"/>
             </a:pPr>
             <a:r>
+              <a:rPr lang="en-US" sz="1800" dirty="0">
+                <a:solidFill>
+                  <a:schemeClr val="tx1"/>
+                </a:solidFill>
+              </a:rPr>
+              <a:t>def </a:t>
+            </a:r>
+            <a:r>
               <a:rPr lang="en-US" sz="1800" dirty="0" err="1">
                 <a:solidFill>
                   <a:schemeClr val="tx1"/>
                 </a:solidFill>
               </a:rPr>
-              <a:t>kf</a:t>
+              <a:t>clean_text</a:t>
             </a:r>
             <a:r>
               <a:rPr lang="en-US" sz="1800" dirty="0">
@@ -11616,39 +10906,7 @@
                   <a:schemeClr val="tx1"/>
                 </a:solidFill>
               </a:rPr>
-              <a:t> = </a:t>
-            </a:r>
-            <a:r>
-              <a:rPr lang="en-US" sz="1800" dirty="0" err="1">
-                <a:solidFill>
-                  <a:schemeClr val="tx1"/>
-                </a:solidFill>
-              </a:rPr>
-              <a:t>KFold</a:t>
-            </a:r>
-            <a:r>
-              <a:rPr lang="en-US" sz="1800" dirty="0">
-                <a:solidFill>
-                  <a:schemeClr val="tx1"/>
-                </a:solidFill>
-              </a:rPr>
-              <a:t> (</a:t>
-            </a:r>
-            <a:r>
-              <a:rPr lang="en-US" sz="1800" dirty="0" err="1">
-                <a:solidFill>
-                  <a:schemeClr val="tx1"/>
-                </a:solidFill>
-              </a:rPr>
-              <a:t>n_splits</a:t>
-            </a:r>
-            <a:r>
-              <a:rPr lang="en-US" sz="1800" dirty="0">
-                <a:solidFill>
-                  <a:schemeClr val="tx1"/>
-                </a:solidFill>
-              </a:rPr>
-              <a:t>=5)</a:t>
+              <a:t>(txt):</a:t>
             </a:r>
           </a:p>
           <a:p>
@@ -11666,7 +10924,7 @@
                   <a:schemeClr val="tx1"/>
                 </a:solidFill>
               </a:rPr>
-              <a:t>rf = </a:t>
+              <a:t>    #print ('</a:t>
             </a:r>
             <a:r>
               <a:rPr lang="en-US" sz="1800" dirty="0" err="1">
@@ -11674,7 +10932,7 @@
                   <a:schemeClr val="tx1"/>
                 </a:solidFill>
               </a:rPr>
-              <a:t>RandomForestClassifier</a:t>
+              <a:t>clean_text</a:t>
             </a:r>
             <a:r>
               <a:rPr lang="en-US" sz="1800" dirty="0">
@@ -11682,7 +10940,25 @@
                   <a:schemeClr val="tx1"/>
                 </a:solidFill>
               </a:rPr>
-              <a:t> (</a:t>
+              <a:t>:', txt)</a:t>
+            </a:r>
+          </a:p>
+          <a:p>
+            <a:pPr marL="342900" indent="-342900" algn="l">
+              <a:buClr>
+                <a:srgbClr val="0070C0"/>
+              </a:buClr>
+              <a:buSzPct val="80000"/>
+              <a:buFont typeface="Wingdings" pitchFamily="2" charset="2"/>
+              <a:buChar char="u"/>
+            </a:pPr>
+            <a:r>
+              <a:rPr lang="en-US" sz="1800" dirty="0">
+                <a:solidFill>
+                  <a:schemeClr val="tx1"/>
+                </a:solidFill>
+              </a:rPr>
+              <a:t>    txt = "".join([c for c in txt if c not in </a:t>
             </a:r>
             <a:r>
               <a:rPr lang="en-US" sz="1800" dirty="0" err="1">
@@ -11690,7 +10966,7 @@
                   <a:schemeClr val="tx1"/>
                 </a:solidFill>
               </a:rPr>
-              <a:t>n_jobs</a:t>
+              <a:t>string.punctuation</a:t>
             </a:r>
             <a:r>
               <a:rPr lang="en-US" sz="1800" dirty="0">
@@ -11698,7 +10974,324 @@
                   <a:schemeClr val="tx1"/>
                 </a:solidFill>
               </a:rPr>
-              <a:t>=-</a:t>
+              <a:t>])</a:t>
+            </a:r>
+          </a:p>
+          <a:p>
+            <a:pPr marL="342900" indent="-342900" algn="l">
+              <a:buClr>
+                <a:srgbClr val="0070C0"/>
+              </a:buClr>
+              <a:buSzPct val="80000"/>
+              <a:buFont typeface="Wingdings" pitchFamily="2" charset="2"/>
+              <a:buChar char="u"/>
+            </a:pPr>
+            <a:r>
+              <a:rPr lang="en-US" sz="1800" dirty="0">
+                <a:solidFill>
+                  <a:schemeClr val="tx1"/>
+                </a:solidFill>
+              </a:rPr>
+              <a:t>    tokens = </a:t>
+            </a:r>
+            <a:r>
+              <a:rPr lang="en-US" sz="1800" dirty="0" err="1">
+                <a:solidFill>
+                  <a:schemeClr val="tx1"/>
+                </a:solidFill>
+              </a:rPr>
+              <a:t>re.split</a:t>
+            </a:r>
+            <a:r>
+              <a:rPr lang="en-US" sz="1800" dirty="0">
+                <a:solidFill>
+                  <a:schemeClr val="tx1"/>
+                </a:solidFill>
+              </a:rPr>
+              <a:t>('\W+', txt)</a:t>
+            </a:r>
+          </a:p>
+          <a:p>
+            <a:pPr marL="342900" indent="-342900" algn="l">
+              <a:buClr>
+                <a:srgbClr val="0070C0"/>
+              </a:buClr>
+              <a:buSzPct val="80000"/>
+              <a:buFont typeface="Wingdings" pitchFamily="2" charset="2"/>
+              <a:buChar char="u"/>
+            </a:pPr>
+            <a:r>
+              <a:rPr lang="en-US" sz="1800" dirty="0">
+                <a:solidFill>
+                  <a:schemeClr val="tx1"/>
+                </a:solidFill>
+              </a:rPr>
+              <a:t>    txt = [</a:t>
+            </a:r>
+            <a:r>
+              <a:rPr lang="en-US" sz="1800" dirty="0" err="1">
+                <a:solidFill>
+                  <a:schemeClr val="tx1"/>
+                </a:solidFill>
+              </a:rPr>
+              <a:t>ps.stem</a:t>
+            </a:r>
+            <a:r>
+              <a:rPr lang="en-US" sz="1800" dirty="0">
+                <a:solidFill>
+                  <a:schemeClr val="tx1"/>
+                </a:solidFill>
+              </a:rPr>
+              <a:t>(word) for word in tokens if word not in </a:t>
+            </a:r>
+            <a:r>
+              <a:rPr lang="en-US" sz="1800" dirty="0" err="1">
+                <a:solidFill>
+                  <a:schemeClr val="tx1"/>
+                </a:solidFill>
+              </a:rPr>
+              <a:t>stopwords</a:t>
+            </a:r>
+            <a:r>
+              <a:rPr lang="en-US" sz="1800" dirty="0">
+                <a:solidFill>
+                  <a:schemeClr val="tx1"/>
+                </a:solidFill>
+              </a:rPr>
+              <a:t>]</a:t>
+            </a:r>
+          </a:p>
+          <a:p>
+            <a:pPr marL="342900" indent="-342900" algn="l">
+              <a:buClr>
+                <a:srgbClr val="0070C0"/>
+              </a:buClr>
+              <a:buSzPct val="80000"/>
+              <a:buFont typeface="Wingdings" pitchFamily="2" charset="2"/>
+              <a:buChar char="u"/>
+            </a:pPr>
+            <a:r>
+              <a:rPr lang="en-US" sz="1800" dirty="0">
+                <a:solidFill>
+                  <a:schemeClr val="tx1"/>
+                </a:solidFill>
+              </a:rPr>
+              <a:t>    return txt</a:t>
+            </a:r>
+          </a:p>
+          <a:p>
+            <a:pPr marL="342900" indent="-342900" algn="l">
+              <a:buClr>
+                <a:srgbClr val="0070C0"/>
+              </a:buClr>
+              <a:buSzPct val="80000"/>
+              <a:buFont typeface="Wingdings" pitchFamily="2" charset="2"/>
+              <a:buChar char="u"/>
+            </a:pPr>
+            <a:r>
+              <a:rPr lang="en-US" sz="1800" dirty="0">
+                <a:solidFill>
+                  <a:schemeClr val="tx1"/>
+                </a:solidFill>
+              </a:rPr>
+              <a:t># </a:t>
+            </a:r>
+          </a:p>
+          <a:p>
+            <a:pPr marL="342900" indent="-342900" algn="l">
+              <a:buClr>
+                <a:srgbClr val="0070C0"/>
+              </a:buClr>
+              <a:buSzPct val="80000"/>
+              <a:buFont typeface="Wingdings" pitchFamily="2" charset="2"/>
+              <a:buChar char="u"/>
+            </a:pPr>
+            <a:r>
+              <a:rPr lang="en-US" sz="1800" dirty="0">
+                <a:solidFill>
+                  <a:schemeClr val="tx1"/>
+                </a:solidFill>
+              </a:rPr>
+              <a:t>from </a:t>
+            </a:r>
+            <a:r>
+              <a:rPr lang="en-US" sz="1800" dirty="0" err="1">
+                <a:solidFill>
+                  <a:schemeClr val="tx1"/>
+                </a:solidFill>
+              </a:rPr>
+              <a:t>sklearn.feature_extraction.text</a:t>
+            </a:r>
+            <a:r>
+              <a:rPr lang="en-US" sz="1800" dirty="0">
+                <a:solidFill>
+                  <a:schemeClr val="tx1"/>
+                </a:solidFill>
+              </a:rPr>
+              <a:t> import </a:t>
+            </a:r>
+            <a:r>
+              <a:rPr lang="en-US" sz="1800" dirty="0" err="1">
+                <a:solidFill>
+                  <a:schemeClr val="tx1"/>
+                </a:solidFill>
+              </a:rPr>
+              <a:t>TfidfVectorizer</a:t>
+            </a:r>
+            <a:endParaRPr lang="en-US" sz="1800" dirty="0">
+              <a:solidFill>
+                <a:schemeClr val="tx1"/>
+              </a:solidFill>
+            </a:endParaRPr>
+          </a:p>
+          <a:p>
+            <a:pPr marL="342900" indent="-342900" algn="l">
+              <a:buClr>
+                <a:srgbClr val="0070C0"/>
+              </a:buClr>
+              <a:buSzPct val="80000"/>
+              <a:buFont typeface="Wingdings" pitchFamily="2" charset="2"/>
+              <a:buChar char="u"/>
+            </a:pPr>
+            <a:r>
+              <a:rPr lang="en-US" sz="1800" dirty="0" err="1">
+                <a:solidFill>
+                  <a:schemeClr val="tx1"/>
+                </a:solidFill>
+              </a:rPr>
+              <a:t>tfidf</a:t>
+            </a:r>
+            <a:r>
+              <a:rPr lang="en-US" sz="1800" dirty="0">
+                <a:solidFill>
+                  <a:schemeClr val="tx1"/>
+                </a:solidFill>
+              </a:rPr>
+              <a:t> = </a:t>
+            </a:r>
+            <a:r>
+              <a:rPr lang="en-US" sz="1800" dirty="0" err="1">
+                <a:solidFill>
+                  <a:schemeClr val="tx1"/>
+                </a:solidFill>
+              </a:rPr>
+              <a:t>TfidfVectorizer</a:t>
+            </a:r>
+            <a:r>
+              <a:rPr lang="en-US" sz="1800" dirty="0">
+                <a:solidFill>
+                  <a:schemeClr val="tx1"/>
+                </a:solidFill>
+              </a:rPr>
+              <a:t>(analyzer=</a:t>
+            </a:r>
+            <a:r>
+              <a:rPr lang="en-US" sz="1800" dirty="0" err="1">
+                <a:solidFill>
+                  <a:schemeClr val="tx1"/>
+                </a:solidFill>
+              </a:rPr>
+              <a:t>clean_text</a:t>
+            </a:r>
+            <a:r>
+              <a:rPr lang="en-US" sz="1800" dirty="0">
+                <a:solidFill>
+                  <a:schemeClr val="tx1"/>
+                </a:solidFill>
+              </a:rPr>
+              <a:t>) </a:t>
+            </a:r>
+          </a:p>
+          <a:p>
+            <a:pPr marL="342900" indent="-342900" algn="l">
+              <a:buClr>
+                <a:srgbClr val="0070C0"/>
+              </a:buClr>
+              <a:buSzPct val="80000"/>
+              <a:buFont typeface="Wingdings" pitchFamily="2" charset="2"/>
+              <a:buChar char="u"/>
+            </a:pPr>
+            <a:r>
+              <a:rPr lang="en-US" sz="1800" dirty="0">
+                <a:solidFill>
+                  <a:schemeClr val="tx1"/>
+                </a:solidFill>
+              </a:rPr>
+              <a:t># The </a:t>
+            </a:r>
+            <a:r>
+              <a:rPr lang="en-US" sz="1800" dirty="0" err="1">
+                <a:solidFill>
+                  <a:schemeClr val="tx1"/>
+                </a:solidFill>
+              </a:rPr>
+              <a:t>fit_transform</a:t>
+            </a:r>
+            <a:r>
+              <a:rPr lang="en-US" sz="1800" dirty="0">
+                <a:solidFill>
+                  <a:schemeClr val="tx1"/>
+                </a:solidFill>
+              </a:rPr>
+              <a:t> trigger the </a:t>
+            </a:r>
+            <a:r>
+              <a:rPr lang="en-US" sz="1800" dirty="0" err="1">
+                <a:solidFill>
+                  <a:schemeClr val="tx1"/>
+                </a:solidFill>
+              </a:rPr>
+              <a:t>clean_text</a:t>
+            </a:r>
+            <a:r>
+              <a:rPr lang="en-US" sz="1800" dirty="0">
+                <a:solidFill>
+                  <a:schemeClr val="tx1"/>
+                </a:solidFill>
+              </a:rPr>
+              <a:t> and data['msg’]</a:t>
+            </a:r>
+          </a:p>
+          <a:p>
+            <a:pPr marL="342900" indent="-342900" algn="l">
+              <a:buClr>
+                <a:srgbClr val="0070C0"/>
+              </a:buClr>
+              <a:buSzPct val="80000"/>
+              <a:buFont typeface="Wingdings" pitchFamily="2" charset="2"/>
+              <a:buChar char="u"/>
+            </a:pPr>
+            <a:r>
+              <a:rPr lang="en-US" sz="1800" dirty="0" err="1">
+                <a:solidFill>
+                  <a:schemeClr val="tx1"/>
+                </a:solidFill>
+              </a:rPr>
+              <a:t>X_tfidf</a:t>
+            </a:r>
+            <a:r>
+              <a:rPr lang="en-US" sz="1800" dirty="0">
+                <a:solidFill>
+                  <a:schemeClr val="tx1"/>
+                </a:solidFill>
+              </a:rPr>
+              <a:t> = </a:t>
+            </a:r>
+            <a:r>
+              <a:rPr lang="en-US" sz="1800" dirty="0" err="1">
+                <a:solidFill>
+                  <a:schemeClr val="tx1"/>
+                </a:solidFill>
+              </a:rPr>
+              <a:t>tfidf.fit_transform</a:t>
+            </a:r>
+            <a:r>
+              <a:rPr lang="en-US" sz="1800" dirty="0">
+                <a:solidFill>
+                  <a:schemeClr val="tx1"/>
+                </a:solidFill>
+              </a:rPr>
+              <a:t>(data['msg'])</a:t>
             </a:r>
           </a:p>
         </p:txBody>
@@ -11818,7 +11411,7 @@
     </p:spTree>
     <p:extLst>
       <p:ext uri="{BB962C8B-B14F-4D97-AF65-F5344CB8AC3E}">
-        <p14:creationId xmlns:p14="http://schemas.microsoft.com/office/powerpoint/2010/main" val="4187789628"/>
+        <p14:creationId xmlns:p14="http://schemas.microsoft.com/office/powerpoint/2010/main" val="3435755650"/>
       </p:ext>
     </p:extLst>
   </p:cSld>
@@ -11857,9 +11450,273 @@
         </p:nvSpPr>
         <p:spPr>
           <a:xfrm>
-            <a:off x="0" y="2130425"/>
-            <a:ext cx="9144000" cy="1470025"/>
-          </a:xfrm>
+            <a:off x="0" y="1"/>
+            <a:ext cx="9144000" cy="764704"/>
+          </a:xfrm>
+          <a:gradFill flip="none" rotWithShape="1">
+            <a:gsLst>
+              <a:gs pos="0">
+                <a:srgbClr val="C00000">
+                  <a:shade val="30000"/>
+                  <a:satMod val="115000"/>
+                </a:srgbClr>
+              </a:gs>
+              <a:gs pos="50000">
+                <a:srgbClr val="C00000">
+                  <a:shade val="67500"/>
+                  <a:satMod val="115000"/>
+                </a:srgbClr>
+              </a:gs>
+              <a:gs pos="100000">
+                <a:srgbClr val="C00000">
+                  <a:shade val="100000"/>
+                  <a:satMod val="115000"/>
+                </a:srgbClr>
+              </a:gs>
+            </a:gsLst>
+            <a:path path="circle">
+              <a:fillToRect t="100000" r="100000"/>
+            </a:path>
+            <a:tileRect l="-100000" b="-100000"/>
+          </a:gradFill>
+        </p:spPr>
+        <p:txBody>
+          <a:bodyPr>
+            <a:normAutofit/>
+          </a:bodyPr>
+          <a:lstStyle/>
+          <a:p>
+            <a:pPr algn="l"/>
+            <a:r>
+              <a:rPr lang="en-US" altLang="zh-TW" b="1" dirty="0">
+                <a:solidFill>
+                  <a:srgbClr val="FFFF00"/>
+                </a:solidFill>
+              </a:rPr>
+              <a:t>25.7 Quiz</a:t>
+            </a:r>
+            <a:endParaRPr lang="zh-TW" altLang="en-US" b="1" dirty="0">
+              <a:solidFill>
+                <a:srgbClr val="FFFF00"/>
+              </a:solidFill>
+            </a:endParaRPr>
+          </a:p>
+        </p:txBody>
+      </p:sp>
+      <p:sp>
+        <p:nvSpPr>
+          <p:cNvPr id="3" name="副標題 2"/>
+          <p:cNvSpPr>
+            <a:spLocks noGrp="1"/>
+          </p:cNvSpPr>
+          <p:nvPr>
+            <p:ph type="subTitle" idx="1"/>
+          </p:nvPr>
+        </p:nvSpPr>
+        <p:spPr>
+          <a:xfrm>
+            <a:off x="425697" y="1259368"/>
+            <a:ext cx="8106743" cy="1665576"/>
+          </a:xfrm>
+          <a:ln>
+            <a:solidFill>
+              <a:srgbClr val="C00000"/>
+            </a:solidFill>
+          </a:ln>
+        </p:spPr>
+        <p:txBody>
+          <a:bodyPr>
+            <a:noAutofit/>
+          </a:bodyPr>
+          <a:lstStyle/>
+          <a:p>
+            <a:pPr marL="342900" indent="-342900" algn="l">
+              <a:buClr>
+                <a:srgbClr val="0070C0"/>
+              </a:buClr>
+              <a:buSzPct val="80000"/>
+              <a:buFont typeface="Wingdings" pitchFamily="2" charset="2"/>
+              <a:buChar char="u"/>
+            </a:pPr>
+            <a:r>
+              <a:rPr lang="en-US" sz="1800" b="1" dirty="0">
+                <a:solidFill>
+                  <a:schemeClr val="tx1"/>
+                </a:solidFill>
+              </a:rPr>
+              <a:t>Quiz</a:t>
+            </a:r>
+          </a:p>
+          <a:p>
+            <a:pPr marL="342900" indent="-342900" algn="l">
+              <a:buClr>
+                <a:srgbClr val="0070C0"/>
+              </a:buClr>
+              <a:buSzPct val="80000"/>
+              <a:buFont typeface="Wingdings" pitchFamily="2" charset="2"/>
+              <a:buChar char="u"/>
+            </a:pPr>
+            <a:r>
+              <a:rPr lang="en-US" sz="1800" dirty="0">
+                <a:solidFill>
+                  <a:schemeClr val="tx1"/>
+                </a:solidFill>
+              </a:rPr>
+              <a:t>4. What statements for Combine message length, </a:t>
+            </a:r>
+            <a:r>
+              <a:rPr lang="en-US" sz="1800" dirty="0" err="1">
+                <a:solidFill>
+                  <a:schemeClr val="tx1"/>
+                </a:solidFill>
+              </a:rPr>
+              <a:t>punctionation</a:t>
+            </a:r>
+            <a:r>
+              <a:rPr lang="en-US" sz="1800" dirty="0">
+                <a:solidFill>
+                  <a:schemeClr val="tx1"/>
+                </a:solidFill>
+              </a:rPr>
+              <a:t>%, and X ?</a:t>
+            </a:r>
+          </a:p>
+          <a:p>
+            <a:pPr marL="342900" indent="-342900" algn="l">
+              <a:buClr>
+                <a:srgbClr val="0070C0"/>
+              </a:buClr>
+              <a:buSzPct val="80000"/>
+              <a:buFont typeface="Wingdings" pitchFamily="2" charset="2"/>
+              <a:buChar char="u"/>
+            </a:pPr>
+            <a:r>
+              <a:rPr lang="en-US" sz="1800" dirty="0">
+                <a:solidFill>
+                  <a:schemeClr val="tx1"/>
+                </a:solidFill>
+              </a:rPr>
+              <a:t>Ans:</a:t>
+            </a:r>
+          </a:p>
+          <a:p>
+            <a:pPr marL="342900" indent="-342900" algn="l">
+              <a:buClr>
+                <a:srgbClr val="0070C0"/>
+              </a:buClr>
+              <a:buSzPct val="80000"/>
+              <a:buFont typeface="Wingdings" pitchFamily="2" charset="2"/>
+              <a:buChar char="u"/>
+            </a:pPr>
+            <a:r>
+              <a:rPr lang="en-US" sz="1800" dirty="0">
+                <a:solidFill>
+                  <a:schemeClr val="tx1"/>
+                </a:solidFill>
+              </a:rPr>
+              <a:t>X = </a:t>
+            </a:r>
+            <a:r>
+              <a:rPr lang="en-US" sz="1800" dirty="0" err="1">
+                <a:solidFill>
+                  <a:schemeClr val="tx1"/>
+                </a:solidFill>
+              </a:rPr>
+              <a:t>pd.concat</a:t>
+            </a:r>
+            <a:r>
+              <a:rPr lang="en-US" sz="1800" dirty="0">
+                <a:solidFill>
+                  <a:schemeClr val="tx1"/>
+                </a:solidFill>
+              </a:rPr>
+              <a:t> ([data['</a:t>
+            </a:r>
+            <a:r>
+              <a:rPr lang="en-US" sz="1800" dirty="0" err="1">
+                <a:solidFill>
+                  <a:schemeClr val="tx1"/>
+                </a:solidFill>
+              </a:rPr>
+              <a:t>msg_len</a:t>
+            </a:r>
+            <a:r>
+              <a:rPr lang="en-US" sz="1800" dirty="0">
+                <a:solidFill>
+                  <a:schemeClr val="tx1"/>
+                </a:solidFill>
+              </a:rPr>
+              <a:t>'], data['punctuation_%'], \</a:t>
+            </a:r>
+          </a:p>
+          <a:p>
+            <a:pPr marL="342900" indent="-342900" algn="l">
+              <a:buClr>
+                <a:srgbClr val="0070C0"/>
+              </a:buClr>
+              <a:buSzPct val="80000"/>
+              <a:buFont typeface="Wingdings" pitchFamily="2" charset="2"/>
+              <a:buChar char="u"/>
+            </a:pPr>
+            <a:r>
+              <a:rPr lang="en-US" sz="1800" dirty="0">
+                <a:solidFill>
+                  <a:schemeClr val="tx1"/>
+                </a:solidFill>
+              </a:rPr>
+              <a:t>    </a:t>
+            </a:r>
+            <a:r>
+              <a:rPr lang="en-US" sz="1800" dirty="0" err="1">
+                <a:solidFill>
+                  <a:schemeClr val="tx1"/>
+                </a:solidFill>
+              </a:rPr>
+              <a:t>pd.DataFrame</a:t>
+            </a:r>
+            <a:r>
+              <a:rPr lang="en-US" sz="1800" dirty="0">
+                <a:solidFill>
+                  <a:schemeClr val="tx1"/>
+                </a:solidFill>
+              </a:rPr>
+              <a:t>(</a:t>
+            </a:r>
+            <a:r>
+              <a:rPr lang="en-US" sz="1800" dirty="0" err="1">
+                <a:solidFill>
+                  <a:schemeClr val="tx1"/>
+                </a:solidFill>
+              </a:rPr>
+              <a:t>X_tfidf.toarray</a:t>
+            </a:r>
+            <a:r>
+              <a:rPr lang="en-US" sz="1800" dirty="0">
+                <a:solidFill>
+                  <a:schemeClr val="tx1"/>
+                </a:solidFill>
+              </a:rPr>
+              <a:t>())], axis=1)</a:t>
+            </a:r>
+          </a:p>
+        </p:txBody>
+      </p:sp>
+      <p:sp>
+        <p:nvSpPr>
+          <p:cNvPr id="4" name="標題 1"/>
+          <p:cNvSpPr txBox="1">
+            <a:spLocks/>
+          </p:cNvSpPr>
+          <p:nvPr/>
+        </p:nvSpPr>
+        <p:spPr>
+          <a:xfrm>
+            <a:off x="0" y="764704"/>
+            <a:ext cx="9144000" cy="360040"/>
+          </a:xfrm>
+          <a:prstGeom prst="rect">
+            <a:avLst/>
+          </a:prstGeom>
           <a:gradFill flip="none" rotWithShape="1">
             <a:gsLst>
               <a:gs pos="0">
@@ -11888,6 +11745,623 @@
           </a:gradFill>
         </p:spPr>
         <p:txBody>
+          <a:bodyPr vert="horz" lIns="91440" tIns="45720" rIns="91440" bIns="45720" rtlCol="0" anchor="ctr">
+            <a:normAutofit fontScale="85000" lnSpcReduction="10000"/>
+          </a:bodyPr>
+          <a:lstStyle/>
+          <a:p>
+            <a:pPr lvl="0">
+              <a:spcBef>
+                <a:spcPct val="0"/>
+              </a:spcBef>
+            </a:pPr>
+            <a:r>
+              <a:rPr lang="en-US" sz="1600" dirty="0">
+                <a:hlinkClick r:id="rId2"/>
+              </a:rPr>
+              <a:t>https://www.udemy.com/course/natural-language-processingnlp-with-python-and-nltk/learn/lecture/16695134#overview</a:t>
+            </a:r>
+            <a:endParaRPr lang="zh-TW" altLang="en-US" sz="1600" dirty="0"/>
+          </a:p>
+        </p:txBody>
+      </p:sp>
+      <p:sp>
+        <p:nvSpPr>
+          <p:cNvPr id="5" name="日期版面配置區 4"/>
+          <p:cNvSpPr>
+            <a:spLocks noGrp="1"/>
+          </p:cNvSpPr>
+          <p:nvPr>
+            <p:ph type="dt" sz="half" idx="10"/>
+          </p:nvPr>
+        </p:nvSpPr>
+        <p:spPr/>
+        <p:txBody>
+          <a:bodyPr/>
+          <a:lstStyle/>
+          <a:p>
+            <a:fld id="{A4F910E6-8D00-4BAF-8C48-9688E0B449D3}" type="datetime1">
+              <a:rPr lang="zh-TW" altLang="en-US" smtClean="0"/>
+              <a:pPr/>
+              <a:t>2020/6/21</a:t>
+            </a:fld>
+            <a:endParaRPr lang="zh-TW" altLang="en-US"/>
+          </a:p>
+        </p:txBody>
+      </p:sp>
+      <p:sp>
+        <p:nvSpPr>
+          <p:cNvPr id="6" name="投影片編號版面配置區 5"/>
+          <p:cNvSpPr>
+            <a:spLocks noGrp="1"/>
+          </p:cNvSpPr>
+          <p:nvPr>
+            <p:ph type="sldNum" sz="quarter" idx="12"/>
+          </p:nvPr>
+        </p:nvSpPr>
+        <p:spPr/>
+        <p:txBody>
+          <a:bodyPr/>
+          <a:lstStyle/>
+          <a:p>
+            <a:fld id="{E4D7E63D-91F2-4366-A2C4-1B00C9E2590E}" type="slidenum">
+              <a:rPr lang="zh-TW" altLang="en-US" smtClean="0"/>
+              <a:pPr/>
+              <a:t>22</a:t>
+            </a:fld>
+            <a:endParaRPr lang="zh-TW" altLang="en-US"/>
+          </a:p>
+        </p:txBody>
+      </p:sp>
+    </p:spTree>
+    <p:extLst>
+      <p:ext uri="{BB962C8B-B14F-4D97-AF65-F5344CB8AC3E}">
+        <p14:creationId xmlns:p14="http://schemas.microsoft.com/office/powerpoint/2010/main" val="495369245"/>
+      </p:ext>
+    </p:extLst>
+  </p:cSld>
+  <p:clrMapOvr>
+    <a:masterClrMapping/>
+  </p:clrMapOvr>
+</p:sld>
+</file>
+
+<file path=ppt/slides/slide23.xml><?xml version="1.0" encoding="utf-8"?>
+<p:sld xmlns:a="http://schemas.openxmlformats.org/drawingml/2006/main" xmlns:r="http://schemas.openxmlformats.org/officeDocument/2006/relationships" xmlns:p="http://schemas.openxmlformats.org/presentationml/2006/main">
+  <p:cSld>
+    <p:spTree>
+      <p:nvGrpSpPr>
+        <p:cNvPr id="1" name=""/>
+        <p:cNvGrpSpPr/>
+        <p:nvPr/>
+      </p:nvGrpSpPr>
+      <p:grpSpPr>
+        <a:xfrm>
+          <a:off x="0" y="0"/>
+          <a:ext cx="0" cy="0"/>
+          <a:chOff x="0" y="0"/>
+          <a:chExt cx="0" cy="0"/>
+        </a:xfrm>
+      </p:grpSpPr>
+      <p:sp>
+        <p:nvSpPr>
+          <p:cNvPr id="2" name="標題 1"/>
+          <p:cNvSpPr>
+            <a:spLocks noGrp="1"/>
+          </p:cNvSpPr>
+          <p:nvPr>
+            <p:ph type="ctrTitle"/>
+          </p:nvPr>
+        </p:nvSpPr>
+        <p:spPr>
+          <a:xfrm>
+            <a:off x="0" y="1"/>
+            <a:ext cx="9144000" cy="764704"/>
+          </a:xfrm>
+          <a:gradFill flip="none" rotWithShape="1">
+            <a:gsLst>
+              <a:gs pos="0">
+                <a:srgbClr val="C00000">
+                  <a:shade val="30000"/>
+                  <a:satMod val="115000"/>
+                </a:srgbClr>
+              </a:gs>
+              <a:gs pos="50000">
+                <a:srgbClr val="C00000">
+                  <a:shade val="67500"/>
+                  <a:satMod val="115000"/>
+                </a:srgbClr>
+              </a:gs>
+              <a:gs pos="100000">
+                <a:srgbClr val="C00000">
+                  <a:shade val="100000"/>
+                  <a:satMod val="115000"/>
+                </a:srgbClr>
+              </a:gs>
+            </a:gsLst>
+            <a:path path="circle">
+              <a:fillToRect t="100000" r="100000"/>
+            </a:path>
+            <a:tileRect l="-100000" b="-100000"/>
+          </a:gradFill>
+        </p:spPr>
+        <p:txBody>
+          <a:bodyPr>
+            <a:normAutofit/>
+          </a:bodyPr>
+          <a:lstStyle/>
+          <a:p>
+            <a:pPr algn="l"/>
+            <a:r>
+              <a:rPr lang="en-US" altLang="zh-TW" b="1" dirty="0">
+                <a:solidFill>
+                  <a:srgbClr val="FFFF00"/>
+                </a:solidFill>
+              </a:rPr>
+              <a:t>25.6 Quiz</a:t>
+            </a:r>
+            <a:endParaRPr lang="zh-TW" altLang="en-US" b="1" dirty="0">
+              <a:solidFill>
+                <a:srgbClr val="FFFF00"/>
+              </a:solidFill>
+            </a:endParaRPr>
+          </a:p>
+        </p:txBody>
+      </p:sp>
+      <p:sp>
+        <p:nvSpPr>
+          <p:cNvPr id="3" name="副標題 2"/>
+          <p:cNvSpPr>
+            <a:spLocks noGrp="1"/>
+          </p:cNvSpPr>
+          <p:nvPr>
+            <p:ph type="subTitle" idx="1"/>
+          </p:nvPr>
+        </p:nvSpPr>
+        <p:spPr>
+          <a:xfrm>
+            <a:off x="425697" y="1259368"/>
+            <a:ext cx="8106743" cy="2241640"/>
+          </a:xfrm>
+          <a:ln>
+            <a:solidFill>
+              <a:srgbClr val="C00000"/>
+            </a:solidFill>
+          </a:ln>
+        </p:spPr>
+        <p:txBody>
+          <a:bodyPr>
+            <a:noAutofit/>
+          </a:bodyPr>
+          <a:lstStyle/>
+          <a:p>
+            <a:pPr marL="342900" indent="-342900" algn="l">
+              <a:buClr>
+                <a:srgbClr val="0070C0"/>
+              </a:buClr>
+              <a:buSzPct val="80000"/>
+              <a:buFont typeface="Wingdings" pitchFamily="2" charset="2"/>
+              <a:buChar char="u"/>
+            </a:pPr>
+            <a:r>
+              <a:rPr lang="en-US" sz="1800" b="1" dirty="0">
+                <a:solidFill>
+                  <a:schemeClr val="tx1"/>
+                </a:solidFill>
+              </a:rPr>
+              <a:t>Quiz</a:t>
+            </a:r>
+          </a:p>
+          <a:p>
+            <a:pPr marL="342900" indent="-342900" algn="l">
+              <a:buClr>
+                <a:srgbClr val="0070C0"/>
+              </a:buClr>
+              <a:buSzPct val="80000"/>
+              <a:buFont typeface="Wingdings" pitchFamily="2" charset="2"/>
+              <a:buChar char="u"/>
+            </a:pPr>
+            <a:r>
+              <a:rPr lang="en-US" sz="1800" dirty="0">
+                <a:solidFill>
+                  <a:schemeClr val="tx1"/>
+                </a:solidFill>
+              </a:rPr>
+              <a:t>4. What statements for repeat 5 </a:t>
+            </a:r>
+            <a:r>
+              <a:rPr lang="en-US" sz="1800">
+                <a:solidFill>
+                  <a:schemeClr val="tx1"/>
+                </a:solidFill>
+              </a:rPr>
+              <a:t>times of Random </a:t>
+            </a:r>
+            <a:r>
+              <a:rPr lang="en-US" sz="1800" dirty="0">
+                <a:solidFill>
+                  <a:schemeClr val="tx1"/>
+                </a:solidFill>
+              </a:rPr>
+              <a:t>Forest Classifier and Cross-Validation?</a:t>
+            </a:r>
+          </a:p>
+          <a:p>
+            <a:pPr marL="342900" indent="-342900" algn="l">
+              <a:buClr>
+                <a:srgbClr val="0070C0"/>
+              </a:buClr>
+              <a:buSzPct val="80000"/>
+              <a:buFont typeface="Wingdings" pitchFamily="2" charset="2"/>
+              <a:buChar char="u"/>
+            </a:pPr>
+            <a:r>
+              <a:rPr lang="en-US" sz="1800" dirty="0">
+                <a:solidFill>
+                  <a:schemeClr val="tx1"/>
+                </a:solidFill>
+              </a:rPr>
+              <a:t>Ans:</a:t>
+            </a:r>
+          </a:p>
+          <a:p>
+            <a:pPr marL="342900" indent="-342900" algn="l">
+              <a:buClr>
+                <a:srgbClr val="0070C0"/>
+              </a:buClr>
+              <a:buSzPct val="80000"/>
+              <a:buFont typeface="Wingdings" pitchFamily="2" charset="2"/>
+              <a:buChar char="u"/>
+            </a:pPr>
+            <a:r>
+              <a:rPr lang="en-US" sz="1800" dirty="0">
+                <a:solidFill>
+                  <a:schemeClr val="tx1"/>
+                </a:solidFill>
+              </a:rPr>
+              <a:t>from </a:t>
+            </a:r>
+            <a:r>
+              <a:rPr lang="en-US" sz="1800" dirty="0" err="1">
+                <a:solidFill>
+                  <a:schemeClr val="tx1"/>
+                </a:solidFill>
+              </a:rPr>
+              <a:t>sklearn.model_selection</a:t>
+            </a:r>
+            <a:r>
+              <a:rPr lang="en-US" sz="1800" dirty="0">
+                <a:solidFill>
+                  <a:schemeClr val="tx1"/>
+                </a:solidFill>
+              </a:rPr>
+              <a:t> import </a:t>
+            </a:r>
+            <a:r>
+              <a:rPr lang="en-US" sz="1800" dirty="0" err="1">
+                <a:solidFill>
+                  <a:schemeClr val="tx1"/>
+                </a:solidFill>
+              </a:rPr>
+              <a:t>KFold</a:t>
+            </a:r>
+            <a:r>
+              <a:rPr lang="en-US" sz="1800" dirty="0">
+                <a:solidFill>
+                  <a:schemeClr val="tx1"/>
+                </a:solidFill>
+              </a:rPr>
+              <a:t>, </a:t>
+            </a:r>
+            <a:r>
+              <a:rPr lang="en-US" sz="1800" dirty="0" err="1">
+                <a:solidFill>
+                  <a:schemeClr val="tx1"/>
+                </a:solidFill>
+              </a:rPr>
+              <a:t>cross_val_score</a:t>
+            </a:r>
+            <a:endParaRPr lang="en-US" sz="1800" dirty="0">
+              <a:solidFill>
+                <a:schemeClr val="tx1"/>
+              </a:solidFill>
+            </a:endParaRPr>
+          </a:p>
+          <a:p>
+            <a:pPr marL="342900" indent="-342900" algn="l">
+              <a:buClr>
+                <a:srgbClr val="0070C0"/>
+              </a:buClr>
+              <a:buSzPct val="80000"/>
+              <a:buFont typeface="Wingdings" pitchFamily="2" charset="2"/>
+              <a:buChar char="u"/>
+            </a:pPr>
+            <a:r>
+              <a:rPr lang="en-US" sz="1800" dirty="0" err="1">
+                <a:solidFill>
+                  <a:schemeClr val="tx1"/>
+                </a:solidFill>
+              </a:rPr>
+              <a:t>kf</a:t>
+            </a:r>
+            <a:r>
+              <a:rPr lang="en-US" sz="1800" dirty="0">
+                <a:solidFill>
+                  <a:schemeClr val="tx1"/>
+                </a:solidFill>
+              </a:rPr>
+              <a:t> = </a:t>
+            </a:r>
+            <a:r>
+              <a:rPr lang="en-US" sz="1800" dirty="0" err="1">
+                <a:solidFill>
+                  <a:schemeClr val="tx1"/>
+                </a:solidFill>
+              </a:rPr>
+              <a:t>KFold</a:t>
+            </a:r>
+            <a:r>
+              <a:rPr lang="en-US" sz="1800" dirty="0">
+                <a:solidFill>
+                  <a:schemeClr val="tx1"/>
+                </a:solidFill>
+              </a:rPr>
+              <a:t> (</a:t>
+            </a:r>
+            <a:r>
+              <a:rPr lang="en-US" sz="1800" dirty="0" err="1">
+                <a:solidFill>
+                  <a:schemeClr val="tx1"/>
+                </a:solidFill>
+              </a:rPr>
+              <a:t>n_splits</a:t>
+            </a:r>
+            <a:r>
+              <a:rPr lang="en-US" sz="1800" dirty="0">
+                <a:solidFill>
+                  <a:schemeClr val="tx1"/>
+                </a:solidFill>
+              </a:rPr>
+              <a:t>=5)</a:t>
+            </a:r>
+          </a:p>
+          <a:p>
+            <a:pPr marL="342900" indent="-342900" algn="l">
+              <a:buClr>
+                <a:srgbClr val="0070C0"/>
+              </a:buClr>
+              <a:buSzPct val="80000"/>
+              <a:buFont typeface="Wingdings" pitchFamily="2" charset="2"/>
+              <a:buChar char="u"/>
+            </a:pPr>
+            <a:r>
+              <a:rPr lang="en-US" sz="1800" dirty="0">
+                <a:solidFill>
+                  <a:schemeClr val="tx1"/>
+                </a:solidFill>
+              </a:rPr>
+              <a:t>rf = </a:t>
+            </a:r>
+            <a:r>
+              <a:rPr lang="en-US" sz="1800" dirty="0" err="1">
+                <a:solidFill>
+                  <a:schemeClr val="tx1"/>
+                </a:solidFill>
+              </a:rPr>
+              <a:t>RandomForestClassifier</a:t>
+            </a:r>
+            <a:r>
+              <a:rPr lang="en-US" sz="1800" dirty="0">
+                <a:solidFill>
+                  <a:schemeClr val="tx1"/>
+                </a:solidFill>
+              </a:rPr>
+              <a:t> (</a:t>
+            </a:r>
+            <a:r>
+              <a:rPr lang="en-US" sz="1800" dirty="0" err="1">
+                <a:solidFill>
+                  <a:schemeClr val="tx1"/>
+                </a:solidFill>
+              </a:rPr>
+              <a:t>n_jobs</a:t>
+            </a:r>
+            <a:r>
+              <a:rPr lang="en-US" sz="1800" dirty="0">
+                <a:solidFill>
+                  <a:schemeClr val="tx1"/>
+                </a:solidFill>
+              </a:rPr>
+              <a:t>=-</a:t>
+            </a:r>
+          </a:p>
+        </p:txBody>
+      </p:sp>
+      <p:sp>
+        <p:nvSpPr>
+          <p:cNvPr id="4" name="標題 1"/>
+          <p:cNvSpPr txBox="1">
+            <a:spLocks/>
+          </p:cNvSpPr>
+          <p:nvPr/>
+        </p:nvSpPr>
+        <p:spPr>
+          <a:xfrm>
+            <a:off x="0" y="764704"/>
+            <a:ext cx="9144000" cy="360040"/>
+          </a:xfrm>
+          <a:prstGeom prst="rect">
+            <a:avLst/>
+          </a:prstGeom>
+          <a:gradFill flip="none" rotWithShape="1">
+            <a:gsLst>
+              <a:gs pos="0">
+                <a:srgbClr val="00B0F0">
+                  <a:shade val="30000"/>
+                  <a:satMod val="115000"/>
+                </a:srgbClr>
+              </a:gs>
+              <a:gs pos="50000">
+                <a:srgbClr val="00B0F0">
+                  <a:shade val="67500"/>
+                  <a:satMod val="115000"/>
+                </a:srgbClr>
+              </a:gs>
+              <a:gs pos="100000">
+                <a:srgbClr val="00B0F0">
+                  <a:shade val="100000"/>
+                  <a:satMod val="115000"/>
+                </a:srgbClr>
+              </a:gs>
+            </a:gsLst>
+            <a:path path="circle">
+              <a:fillToRect t="100000" r="100000"/>
+            </a:path>
+            <a:tileRect l="-100000" b="-100000"/>
+          </a:gradFill>
+        </p:spPr>
+        <p:txBody>
+          <a:bodyPr vert="horz" lIns="91440" tIns="45720" rIns="91440" bIns="45720" rtlCol="0" anchor="ctr">
+            <a:normAutofit fontScale="85000" lnSpcReduction="10000"/>
+          </a:bodyPr>
+          <a:lstStyle/>
+          <a:p>
+            <a:pPr lvl="0">
+              <a:spcBef>
+                <a:spcPct val="0"/>
+              </a:spcBef>
+            </a:pPr>
+            <a:r>
+              <a:rPr lang="en-US" sz="1600" dirty="0">
+                <a:hlinkClick r:id="rId2"/>
+              </a:rPr>
+              <a:t>https://www.udemy.com/course/natural-language-processingnlp-with-python-and-nltk/learn/lecture/16695134#overview</a:t>
+            </a:r>
+            <a:endParaRPr lang="zh-TW" altLang="en-US" sz="1600" dirty="0"/>
+          </a:p>
+        </p:txBody>
+      </p:sp>
+      <p:sp>
+        <p:nvSpPr>
+          <p:cNvPr id="5" name="日期版面配置區 4"/>
+          <p:cNvSpPr>
+            <a:spLocks noGrp="1"/>
+          </p:cNvSpPr>
+          <p:nvPr>
+            <p:ph type="dt" sz="half" idx="10"/>
+          </p:nvPr>
+        </p:nvSpPr>
+        <p:spPr/>
+        <p:txBody>
+          <a:bodyPr/>
+          <a:lstStyle/>
+          <a:p>
+            <a:fld id="{A4F910E6-8D00-4BAF-8C48-9688E0B449D3}" type="datetime1">
+              <a:rPr lang="zh-TW" altLang="en-US" smtClean="0"/>
+              <a:pPr/>
+              <a:t>2020/6/21</a:t>
+            </a:fld>
+            <a:endParaRPr lang="zh-TW" altLang="en-US"/>
+          </a:p>
+        </p:txBody>
+      </p:sp>
+      <p:sp>
+        <p:nvSpPr>
+          <p:cNvPr id="6" name="投影片編號版面配置區 5"/>
+          <p:cNvSpPr>
+            <a:spLocks noGrp="1"/>
+          </p:cNvSpPr>
+          <p:nvPr>
+            <p:ph type="sldNum" sz="quarter" idx="12"/>
+          </p:nvPr>
+        </p:nvSpPr>
+        <p:spPr/>
+        <p:txBody>
+          <a:bodyPr/>
+          <a:lstStyle/>
+          <a:p>
+            <a:fld id="{E4D7E63D-91F2-4366-A2C4-1B00C9E2590E}" type="slidenum">
+              <a:rPr lang="zh-TW" altLang="en-US" smtClean="0"/>
+              <a:pPr/>
+              <a:t>23</a:t>
+            </a:fld>
+            <a:endParaRPr lang="zh-TW" altLang="en-US"/>
+          </a:p>
+        </p:txBody>
+      </p:sp>
+    </p:spTree>
+    <p:extLst>
+      <p:ext uri="{BB962C8B-B14F-4D97-AF65-F5344CB8AC3E}">
+        <p14:creationId xmlns:p14="http://schemas.microsoft.com/office/powerpoint/2010/main" val="4187789628"/>
+      </p:ext>
+    </p:extLst>
+  </p:cSld>
+  <p:clrMapOvr>
+    <a:masterClrMapping/>
+  </p:clrMapOvr>
+</p:sld>
+</file>
+
+<file path=ppt/slides/slide24.xml><?xml version="1.0" encoding="utf-8"?>
+<p:sld xmlns:a="http://schemas.openxmlformats.org/drawingml/2006/main" xmlns:r="http://schemas.openxmlformats.org/officeDocument/2006/relationships" xmlns:p="http://schemas.openxmlformats.org/presentationml/2006/main">
+  <p:cSld>
+    <p:spTree>
+      <p:nvGrpSpPr>
+        <p:cNvPr id="1" name=""/>
+        <p:cNvGrpSpPr/>
+        <p:nvPr/>
+      </p:nvGrpSpPr>
+      <p:grpSpPr>
+        <a:xfrm>
+          <a:off x="0" y="0"/>
+          <a:ext cx="0" cy="0"/>
+          <a:chOff x="0" y="0"/>
+          <a:chExt cx="0" cy="0"/>
+        </a:xfrm>
+      </p:grpSpPr>
+      <p:sp>
+        <p:nvSpPr>
+          <p:cNvPr id="2" name="標題 1"/>
+          <p:cNvSpPr>
+            <a:spLocks noGrp="1"/>
+          </p:cNvSpPr>
+          <p:nvPr>
+            <p:ph type="ctrTitle"/>
+          </p:nvPr>
+        </p:nvSpPr>
+        <p:spPr>
+          <a:xfrm>
+            <a:off x="0" y="2130425"/>
+            <a:ext cx="9144000" cy="1470025"/>
+          </a:xfrm>
+          <a:gradFill flip="none" rotWithShape="1">
+            <a:gsLst>
+              <a:gs pos="0">
+                <a:srgbClr val="00B0F0">
+                  <a:shade val="30000"/>
+                  <a:satMod val="115000"/>
+                </a:srgbClr>
+              </a:gs>
+              <a:gs pos="50000">
+                <a:srgbClr val="00B0F0">
+                  <a:shade val="67500"/>
+                  <a:satMod val="115000"/>
+                </a:srgbClr>
+              </a:gs>
+              <a:gs pos="100000">
+                <a:srgbClr val="00B0F0">
+                  <a:shade val="100000"/>
+                  <a:satMod val="115000"/>
+                </a:srgbClr>
+              </a:gs>
+            </a:gsLst>
+            <a:path path="circle">
+              <a:fillToRect t="100000" r="100000"/>
+            </a:path>
+            <a:tileRect l="-100000" b="-100000"/>
+          </a:gradFill>
+        </p:spPr>
+        <p:txBody>
           <a:bodyPr>
             <a:normAutofit/>
           </a:bodyPr>
@@ -11951,7 +12425,7 @@
             <a:fld id="{E4D7E63D-91F2-4366-A2C4-1B00C9E2590E}" type="slidenum">
               <a:rPr lang="zh-TW" altLang="en-US" smtClean="0"/>
               <a:pPr/>
-              <a:t>22</a:t>
+              <a:t>24</a:t>
             </a:fld>
             <a:endParaRPr lang="zh-TW" altLang="en-US"/>
           </a:p>

</xml_diff>